<commit_message>
cont working on poster
</commit_message>
<xml_diff>
--- a/presentations/NeuroeconPoster2018.pptx
+++ b/presentations/NeuroeconPoster2018.pptx
@@ -112,7 +112,7 @@
   </p:defaultTextStyle>
   <p:extLst>
     <p:ext uri="{EFAFB233-063F-42B5-8137-9DF3F51BA10A}">
-      <p15:sldGuideLst xmlns:p15="http://schemas.microsoft.com/office/powerpoint/2012/main" xmlns="">
+      <p15:sldGuideLst xmlns="" xmlns:p15="http://schemas.microsoft.com/office/powerpoint/2012/main">
         <p15:guide id="1" orient="horz" pos="10368">
           <p15:clr>
             <a:srgbClr val="A4A3A4"/>
@@ -217,7 +217,7 @@
           <a:p>
             <a:fld id="{1ADD2877-6E47-914A-A562-5BB1D9253FFF}" type="datetimeFigureOut">
               <a:rPr lang="en-US" smtClean="0"/>
-              <a:t>8/10/18</a:t>
+              <a:t>9/21/18</a:t>
             </a:fld>
             <a:endParaRPr lang="en-US"/>
           </a:p>
@@ -383,7 +383,7 @@
             <a:fld id="{9C8C3FF2-16C4-3444-9527-EB6C5966600B}" type="datetimeFigureOut">
               <a:rPr lang="en-US" smtClean="0"/>
               <a:pPr/>
-              <a:t>8/10/18</a:t>
+              <a:t>9/21/18</a:t>
             </a:fld>
             <a:endParaRPr lang="en-US"/>
           </a:p>
@@ -1116,7 +1116,7 @@
             <a:fld id="{34EA0383-EA84-CF41-8911-55C3D60C640A}" type="datetimeFigureOut">
               <a:rPr lang="en-US" smtClean="0"/>
               <a:pPr/>
-              <a:t>8/10/18</a:t>
+              <a:t>9/21/18</a:t>
             </a:fld>
             <a:endParaRPr lang="en-US"/>
           </a:p>
@@ -1283,7 +1283,7 @@
             <a:fld id="{34EA0383-EA84-CF41-8911-55C3D60C640A}" type="datetimeFigureOut">
               <a:rPr lang="en-US" smtClean="0"/>
               <a:pPr/>
-              <a:t>8/10/18</a:t>
+              <a:t>9/21/18</a:t>
             </a:fld>
             <a:endParaRPr lang="en-US"/>
           </a:p>
@@ -1460,7 +1460,7 @@
             <a:fld id="{34EA0383-EA84-CF41-8911-55C3D60C640A}" type="datetimeFigureOut">
               <a:rPr lang="en-US" smtClean="0"/>
               <a:pPr/>
-              <a:t>8/10/18</a:t>
+              <a:t>9/21/18</a:t>
             </a:fld>
             <a:endParaRPr lang="en-US"/>
           </a:p>
@@ -1627,7 +1627,7 @@
             <a:fld id="{34EA0383-EA84-CF41-8911-55C3D60C640A}" type="datetimeFigureOut">
               <a:rPr lang="en-US" smtClean="0"/>
               <a:pPr/>
-              <a:t>8/10/18</a:t>
+              <a:t>9/21/18</a:t>
             </a:fld>
             <a:endParaRPr lang="en-US"/>
           </a:p>
@@ -1870,7 +1870,7 @@
             <a:fld id="{34EA0383-EA84-CF41-8911-55C3D60C640A}" type="datetimeFigureOut">
               <a:rPr lang="en-US" smtClean="0"/>
               <a:pPr/>
-              <a:t>8/10/18</a:t>
+              <a:t>9/21/18</a:t>
             </a:fld>
             <a:endParaRPr lang="en-US"/>
           </a:p>
@@ -2155,7 +2155,7 @@
             <a:fld id="{34EA0383-EA84-CF41-8911-55C3D60C640A}" type="datetimeFigureOut">
               <a:rPr lang="en-US" smtClean="0"/>
               <a:pPr/>
-              <a:t>8/10/18</a:t>
+              <a:t>9/21/18</a:t>
             </a:fld>
             <a:endParaRPr lang="en-US"/>
           </a:p>
@@ -2579,7 +2579,7 @@
             <a:fld id="{34EA0383-EA84-CF41-8911-55C3D60C640A}" type="datetimeFigureOut">
               <a:rPr lang="en-US" smtClean="0"/>
               <a:pPr/>
-              <a:t>8/10/18</a:t>
+              <a:t>9/21/18</a:t>
             </a:fld>
             <a:endParaRPr lang="en-US"/>
           </a:p>
@@ -2694,7 +2694,7 @@
             <a:fld id="{34EA0383-EA84-CF41-8911-55C3D60C640A}" type="datetimeFigureOut">
               <a:rPr lang="en-US" smtClean="0"/>
               <a:pPr/>
-              <a:t>8/10/18</a:t>
+              <a:t>9/21/18</a:t>
             </a:fld>
             <a:endParaRPr lang="en-US"/>
           </a:p>
@@ -2786,7 +2786,7 @@
             <a:fld id="{34EA0383-EA84-CF41-8911-55C3D60C640A}" type="datetimeFigureOut">
               <a:rPr lang="en-US" smtClean="0"/>
               <a:pPr/>
-              <a:t>8/10/18</a:t>
+              <a:t>9/21/18</a:t>
             </a:fld>
             <a:endParaRPr lang="en-US"/>
           </a:p>
@@ -3060,7 +3060,7 @@
             <a:fld id="{34EA0383-EA84-CF41-8911-55C3D60C640A}" type="datetimeFigureOut">
               <a:rPr lang="en-US" smtClean="0"/>
               <a:pPr/>
-              <a:t>8/10/18</a:t>
+              <a:t>9/21/18</a:t>
             </a:fld>
             <a:endParaRPr lang="en-US"/>
           </a:p>
@@ -3310,7 +3310,7 @@
             <a:fld id="{34EA0383-EA84-CF41-8911-55C3D60C640A}" type="datetimeFigureOut">
               <a:rPr lang="en-US" smtClean="0"/>
               <a:pPr/>
-              <a:t>8/10/18</a:t>
+              <a:t>9/21/18</a:t>
             </a:fld>
             <a:endParaRPr lang="en-US"/>
           </a:p>
@@ -3520,7 +3520,7 @@
             <a:fld id="{34EA0383-EA84-CF41-8911-55C3D60C640A}" type="datetimeFigureOut">
               <a:rPr lang="en-US" smtClean="0"/>
               <a:pPr/>
-              <a:t>8/10/18</a:t>
+              <a:t>9/21/18</a:t>
             </a:fld>
             <a:endParaRPr lang="en-US"/>
           </a:p>
@@ -3934,21 +3934,7 @@
                 <a:latin typeface="Arial"/>
                 <a:cs typeface="Arial"/>
               </a:rPr>
-              <a:t>A large-scale </a:t>
-            </a:r>
-            <a:r>
-              <a:rPr lang="en-US" sz="8700" dirty="0" smtClean="0">
-                <a:latin typeface="Arial"/>
-                <a:cs typeface="Arial"/>
-              </a:rPr>
-              <a:t>comparison of cognitive task measures of self-regulation: raw measures vs. model parameters </a:t>
-            </a:r>
-            <a:r>
-              <a:rPr lang="en-US" sz="8700" dirty="0" smtClean="0">
-                <a:latin typeface="Arial"/>
-                <a:cs typeface="Arial"/>
-              </a:rPr>
-              <a:t>for individual difference analyses</a:t>
+              <a:t>A large-scale comparison of cognitive task measures of self-regulation: raw measures vs. model parameters for individual difference analyses</a:t>
             </a:r>
             <a:endParaRPr lang="en-US" sz="8700" dirty="0">
               <a:latin typeface="Arial"/>
@@ -3961,28 +3947,7 @@
                 <a:latin typeface="Arial"/>
                 <a:cs typeface="Arial"/>
               </a:rPr>
-              <a:t>A. Zeynep Enkavi, Ian </a:t>
-            </a:r>
-            <a:r>
-              <a:rPr lang="en-US" sz="6000" dirty="0" smtClean="0">
-                <a:latin typeface="Arial"/>
-                <a:cs typeface="Arial"/>
-              </a:rPr>
-              <a:t>W. </a:t>
-            </a:r>
-            <a:r>
-              <a:rPr lang="en-US" sz="6000" dirty="0" smtClean="0">
-                <a:latin typeface="Arial"/>
-                <a:cs typeface="Arial"/>
-              </a:rPr>
-              <a:t>Eisenberg, Patrick </a:t>
-            </a:r>
-            <a:r>
-              <a:rPr lang="en-US" sz="6000" dirty="0" smtClean="0">
-                <a:latin typeface="Arial"/>
-                <a:cs typeface="Arial"/>
-              </a:rPr>
-              <a:t>G. </a:t>
+              <a:t>A. Zeynep Enkavi, Ian W. Eisenberg, Patrick G. </a:t>
             </a:r>
             <a:r>
               <a:rPr lang="en-US" sz="6000" dirty="0" err="1" smtClean="0">
@@ -3996,14 +3961,7 @@
                 <a:latin typeface="Arial"/>
                 <a:cs typeface="Arial"/>
               </a:rPr>
-              <a:t>, Russell A</a:t>
-            </a:r>
-            <a:r>
-              <a:rPr lang="en-US" sz="6000" dirty="0" smtClean="0">
-                <a:latin typeface="Arial"/>
-                <a:cs typeface="Arial"/>
-              </a:rPr>
-              <a:t>. </a:t>
+              <a:t>, Russell A. </a:t>
             </a:r>
             <a:r>
               <a:rPr lang="en-US" sz="6000" dirty="0" err="1" smtClean="0">
@@ -4028,31 +3986,7 @@
                 <a:latin typeface="Arial"/>
                 <a:cs typeface="Arial"/>
               </a:rPr>
-              <a:t>Department </a:t>
-            </a:r>
-            <a:r>
-              <a:rPr lang="en-US" sz="4200" dirty="0" smtClean="0">
-                <a:solidFill>
-                  <a:schemeClr val="bg1">
-                    <a:lumMod val="50000"/>
-                  </a:schemeClr>
-                </a:solidFill>
-                <a:latin typeface="Arial"/>
-                <a:cs typeface="Arial"/>
-              </a:rPr>
-              <a:t>of Psychology, Stanford </a:t>
-            </a:r>
-            <a:r>
-              <a:rPr lang="en-US" sz="4200" dirty="0" smtClean="0">
-                <a:solidFill>
-                  <a:schemeClr val="bg1">
-                    <a:lumMod val="50000"/>
-                  </a:schemeClr>
-                </a:solidFill>
-                <a:latin typeface="Arial"/>
-                <a:cs typeface="Arial"/>
-              </a:rPr>
-              <a:t>University</a:t>
+              <a:t>Department of Psychology, Stanford University</a:t>
             </a:r>
             <a:endParaRPr lang="en-US" sz="4200" baseline="30000" dirty="0">
               <a:solidFill>
@@ -4305,35 +4239,7 @@
                 <a:latin typeface="Arial"/>
                 <a:cs typeface="Arial"/>
               </a:rPr>
-              <a:t> </a:t>
-            </a:r>
-            <a:r>
-              <a:rPr lang="en-US" sz="4400" dirty="0" smtClean="0">
-                <a:latin typeface="Arial"/>
-                <a:cs typeface="Arial"/>
-              </a:rPr>
-              <a:t>Psychology </a:t>
-            </a:r>
-            <a:r>
-              <a:rPr lang="en-US" sz="4400" dirty="0" smtClean="0">
-                <a:latin typeface="Arial"/>
-                <a:cs typeface="Arial"/>
-              </a:rPr>
-              <a:t>is rich with </a:t>
-            </a:r>
-            <a:r>
-              <a:rPr lang="en-US" sz="4400" dirty="0" smtClean="0">
-                <a:latin typeface="Arial"/>
-                <a:cs typeface="Arial"/>
-              </a:rPr>
-              <a:t>behavioral tasks measuring </a:t>
-            </a:r>
-            <a:r>
-              <a:rPr lang="en-US" sz="4400" dirty="0" smtClean="0">
-                <a:latin typeface="Arial"/>
-                <a:cs typeface="Arial"/>
-              </a:rPr>
-              <a:t>of </a:t>
+              <a:t> Psychology is rich with behavioral tasks measuring of </a:t>
             </a:r>
             <a:r>
               <a:rPr lang="en-US" sz="4400" dirty="0">
@@ -4399,14 +4305,14 @@
                 <a:latin typeface="Arial"/>
                 <a:cs typeface="Arial"/>
               </a:rPr>
-              <a:t>assumed to capture trait-like individual differences without evaluating their stability over time</a:t>
+              <a:t>assumed to capture trait-like individual differences without evaluating their stability over </a:t>
             </a:r>
             <a:r>
               <a:rPr lang="en-US" sz="4400" dirty="0" smtClean="0">
                 <a:latin typeface="Arial"/>
                 <a:cs typeface="Arial"/>
               </a:rPr>
-              <a:t>. </a:t>
+              <a:t>time </a:t>
             </a:r>
             <a:endParaRPr lang="en-US" sz="4400" dirty="0">
               <a:latin typeface="Arial"/>
@@ -4423,14 +4329,7 @@
                 <a:latin typeface="Arial"/>
                 <a:cs typeface="Arial"/>
               </a:rPr>
-              <a:t> We </a:t>
-            </a:r>
-            <a:r>
-              <a:rPr lang="en-US" sz="4400" dirty="0" smtClean="0">
-                <a:latin typeface="Arial"/>
-                <a:cs typeface="Arial"/>
-              </a:rPr>
-              <a:t>compare two common measure types from a large battery of behavioral tasks to determine best trait measures and their features</a:t>
+              <a:t> We compare two common measure types from a large battery of behavioral tasks to determine best trait measures and their features</a:t>
             </a:r>
             <a:endParaRPr lang="en-US" sz="4400" dirty="0">
               <a:latin typeface="Arial"/>
@@ -4470,69 +4369,49 @@
                 <a:latin typeface="Arial"/>
                 <a:cs typeface="Arial"/>
               </a:rPr>
-              <a:t> </a:t>
-            </a:r>
-            <a:r>
-              <a:rPr lang="en-US" sz="4400" smtClean="0">
-                <a:latin typeface="Arial"/>
-                <a:cs typeface="Arial"/>
-              </a:rPr>
-              <a:t>Extracted 14 </a:t>
+              <a:t> Extracted 14 tasks from larger battery </a:t>
             </a:r>
             <a:r>
               <a:rPr lang="en-US" sz="4400" dirty="0" smtClean="0">
                 <a:latin typeface="Arial"/>
                 <a:cs typeface="Arial"/>
               </a:rPr>
-              <a:t>tasks from larger battery related to self</a:t>
+              <a:t>on reliability of </a:t>
             </a:r>
             <a:r>
               <a:rPr lang="en-US" sz="4400" dirty="0" smtClean="0">
                 <a:latin typeface="Arial"/>
                 <a:cs typeface="Arial"/>
               </a:rPr>
-              <a:t>-regulation </a:t>
-            </a:r>
-            <a:r>
-              <a:rPr lang="en-US" sz="4400" dirty="0" smtClean="0">
-                <a:latin typeface="Arial"/>
-                <a:cs typeface="Arial"/>
-                <a:hlinkClick r:id="rId4"/>
-              </a:rPr>
-              <a:t>https:</a:t>
-            </a:r>
-            <a:r>
-              <a:rPr lang="en-US" sz="4400" dirty="0">
-                <a:latin typeface="Arial"/>
-                <a:cs typeface="Arial"/>
-                <a:hlinkClick r:id="rId4"/>
-              </a:rPr>
-              <a:t>//expfactory.github.io/</a:t>
-            </a:r>
-            <a:r>
-              <a:rPr lang="en-US" sz="4400" dirty="0" smtClean="0">
-                <a:latin typeface="Arial"/>
-                <a:cs typeface="Arial"/>
-                <a:hlinkClick r:id="rId4"/>
-              </a:rPr>
-              <a:t>table.html</a:t>
-            </a:r>
-            <a:endParaRPr lang="en-US" sz="4400" dirty="0" smtClean="0">
-              <a:latin typeface="Arial"/>
-              <a:cs typeface="Arial"/>
-            </a:endParaRPr>
-          </a:p>
-          <a:p>
-            <a:pPr>
-              <a:buFont typeface="Arial"/>
-              <a:buChar char="•"/>
-            </a:pPr>
+              <a:t>self</a:t>
+            </a:r>
             <a:r>
               <a:rPr lang="en-US" sz="4400" dirty="0" smtClean="0">
                 <a:latin typeface="Arial"/>
                 <a:cs typeface="Arial"/>
               </a:rPr>
-              <a:t> N</a:t>
+              <a:t>-</a:t>
+            </a:r>
+            <a:r>
+              <a:rPr lang="en-US" sz="4400" dirty="0" smtClean="0">
+                <a:latin typeface="Arial"/>
+                <a:cs typeface="Arial"/>
+              </a:rPr>
+              <a:t>regulation measures</a:t>
+            </a:r>
+            <a:r>
+              <a:rPr lang="en-US" sz="4400" baseline="30000" dirty="0" smtClean="0">
+                <a:latin typeface="Arial"/>
+                <a:cs typeface="Arial"/>
+              </a:rPr>
+              <a:t>1,2</a:t>
+            </a:r>
+            <a:r>
+              <a:rPr lang="en-US" sz="4400" dirty="0" smtClean="0">
+                <a:latin typeface="Arial"/>
+                <a:cs typeface="Arial"/>
+              </a:rPr>
+              <a:t> (N</a:t>
             </a:r>
             <a:r>
               <a:rPr lang="en-US" sz="4400" dirty="0">
@@ -4546,7 +4425,7 @@
                 <a:latin typeface="Arial"/>
                 <a:cs typeface="Arial"/>
               </a:rPr>
-              <a:t>150 passed QC</a:t>
+              <a:t>150; )</a:t>
             </a:r>
           </a:p>
           <a:p>
@@ -4566,8 +4445,47 @@
                 <a:latin typeface="Arial"/>
                 <a:cs typeface="Arial"/>
               </a:rPr>
-              <a:t>Average retest delay = 115 days (range = 60 - 228 days)</a:t>
-            </a:r>
+              <a:t>Tasks: N-back, ANT, choice RT, directed forgetting, DPX, local globa</a:t>
+            </a:r>
+            <a:r>
+              <a:rPr lang="en-US" sz="4400" dirty="0" smtClean="0">
+                <a:latin typeface="Arial"/>
+                <a:cs typeface="Arial"/>
+              </a:rPr>
+              <a:t>l, recent, probes, shape matching, </a:t>
+            </a:r>
+            <a:r>
+              <a:rPr lang="en-US" sz="4400" dirty="0" err="1" smtClean="0">
+                <a:latin typeface="Arial"/>
+                <a:cs typeface="Arial"/>
+              </a:rPr>
+              <a:t>simon</a:t>
+            </a:r>
+            <a:r>
+              <a:rPr lang="en-US" sz="4400" dirty="0" smtClean="0">
+                <a:latin typeface="Arial"/>
+                <a:cs typeface="Arial"/>
+              </a:rPr>
+              <a:t>, stop signal (x3), </a:t>
+            </a:r>
+            <a:r>
+              <a:rPr lang="en-US" sz="4400" dirty="0" err="1" smtClean="0">
+                <a:latin typeface="Arial"/>
+                <a:cs typeface="Arial"/>
+              </a:rPr>
+              <a:t>stroop</a:t>
+            </a:r>
+            <a:r>
+              <a:rPr lang="en-US" sz="4400" dirty="0" smtClean="0">
+                <a:latin typeface="Arial"/>
+                <a:cs typeface="Arial"/>
+              </a:rPr>
+              <a:t>, cued task switching</a:t>
+            </a:r>
+            <a:endParaRPr lang="en-US" sz="4400" dirty="0" smtClean="0">
+              <a:latin typeface="Arial"/>
+              <a:cs typeface="Arial"/>
+            </a:endParaRPr>
           </a:p>
           <a:p>
             <a:pPr>
@@ -4586,21 +4504,7 @@
                 <a:latin typeface="Arial"/>
                 <a:cs typeface="Arial"/>
               </a:rPr>
-              <a:t>Bootstrapped </a:t>
-            </a:r>
-            <a:r>
-              <a:rPr lang="en-US" sz="4400" dirty="0" smtClean="0">
-                <a:latin typeface="Arial"/>
-                <a:cs typeface="Arial"/>
-              </a:rPr>
-              <a:t>reliabilities (n = 1000</a:t>
-            </a:r>
-            <a:r>
-              <a:rPr lang="en-US" sz="4400" dirty="0" smtClean="0">
-                <a:latin typeface="Arial"/>
-                <a:cs typeface="Arial"/>
-              </a:rPr>
-              <a:t>)</a:t>
+              <a:t>Raw measures: RT and accuracy</a:t>
             </a:r>
           </a:p>
           <a:p>
@@ -4620,32 +4524,8 @@
                 <a:latin typeface="Arial"/>
                 <a:cs typeface="Arial"/>
               </a:rPr>
-              <a:t>Raw measures: RT and accuracy</a:t>
-            </a:r>
-          </a:p>
-          <a:p>
-            <a:pPr>
-              <a:buFont typeface="Arial"/>
-              <a:buChar char="•"/>
-            </a:pPr>
-            <a:r>
-              <a:rPr lang="en-US" sz="4400" dirty="0">
-                <a:latin typeface="Arial"/>
-                <a:cs typeface="Arial"/>
-              </a:rPr>
-              <a:t> </a:t>
-            </a:r>
-            <a:r>
-              <a:rPr lang="en-US" sz="4400" dirty="0" smtClean="0">
-                <a:latin typeface="Arial"/>
-                <a:cs typeface="Arial"/>
-              </a:rPr>
               <a:t>2 types of DDM: EZ and HDDM</a:t>
             </a:r>
-            <a:endParaRPr lang="en-US" sz="4400" dirty="0" smtClean="0">
-              <a:latin typeface="Arial"/>
-              <a:cs typeface="Arial"/>
-            </a:endParaRPr>
           </a:p>
         </p:txBody>
       </p:sp>
@@ -4846,14 +4726,14 @@
       </p:sp>
       <p:sp>
         <p:nvSpPr>
-          <p:cNvPr id="7" name="TextBox 6"/>
-          <p:cNvSpPr txBox="1"/>
+          <p:cNvPr id="47" name="Rectangle 46"/>
+          <p:cNvSpPr/>
           <p:nvPr/>
         </p:nvSpPr>
         <p:spPr>
           <a:xfrm>
-            <a:off x="471431" y="31641920"/>
-            <a:ext cx="9774936" cy="1015663"/>
+            <a:off x="454934" y="24555044"/>
+            <a:ext cx="9774936" cy="5438114"/>
           </a:xfrm>
           <a:prstGeom prst="rect">
             <a:avLst/>
@@ -4861,49 +4741,6 @@
           <a:noFill/>
         </p:spPr>
         <p:txBody>
-          <a:bodyPr wrap="square" rtlCol="0">
-            <a:spAutoFit/>
-          </a:bodyPr>
-          <a:lstStyle/>
-          <a:p>
-            <a:r>
-              <a:rPr lang="en-US" sz="3000" dirty="0" smtClean="0">
-                <a:latin typeface="Arial"/>
-                <a:cs typeface="Arial"/>
-              </a:rPr>
-              <a:t>An interactive version of the literature review as well as a list of all the references can be found </a:t>
-            </a:r>
-            <a:r>
-              <a:rPr lang="en-US" sz="3000" dirty="0" smtClean="0">
-                <a:latin typeface="Arial"/>
-                <a:cs typeface="Arial"/>
-              </a:rPr>
-              <a:t>at</a:t>
-            </a:r>
-            <a:endParaRPr lang="en-US" sz="3000" dirty="0">
-              <a:latin typeface="Arial"/>
-              <a:cs typeface="Arial"/>
-            </a:endParaRPr>
-          </a:p>
-        </p:txBody>
-      </p:sp>
-      <p:sp>
-        <p:nvSpPr>
-          <p:cNvPr id="47" name="Rectangle 46"/>
-          <p:cNvSpPr/>
-          <p:nvPr/>
-        </p:nvSpPr>
-        <p:spPr>
-          <a:xfrm>
-            <a:off x="454934" y="23224704"/>
-            <a:ext cx="9774936" cy="8200712"/>
-          </a:xfrm>
-          <a:prstGeom prst="rect">
-            <a:avLst/>
-          </a:prstGeom>
-          <a:noFill/>
-        </p:spPr>
-        <p:txBody>
           <a:bodyPr wrap="square" lIns="274320" rIns="274320" rtlCol="0">
             <a:noAutofit/>
           </a:bodyPr>
@@ -4918,21 +4755,7 @@
                 <a:latin typeface="Arial"/>
                 <a:cs typeface="Arial"/>
               </a:rPr>
-              <a:t> </a:t>
-            </a:r>
-            <a:r>
-              <a:rPr lang="en-US" sz="4400" dirty="0" smtClean="0">
-                <a:latin typeface="Arial"/>
-                <a:cs typeface="Arial"/>
-              </a:rPr>
-              <a:t>Drift </a:t>
-            </a:r>
-            <a:r>
-              <a:rPr lang="en-US" sz="4400" dirty="0" smtClean="0">
-                <a:latin typeface="Arial"/>
-                <a:cs typeface="Arial"/>
-              </a:rPr>
-              <a:t>diffusion parameters show similar reliability to RT and accuracy</a:t>
+              <a:t> Drift diffusion parameters show similar reliability to RT and accuracy</a:t>
             </a:r>
             <a:endParaRPr lang="en-US" sz="4400" dirty="0">
               <a:latin typeface="Arial"/>
@@ -4951,7 +4774,7 @@
         </p:nvSpPr>
         <p:spPr bwMode="auto">
           <a:xfrm>
-            <a:off x="471431" y="22380531"/>
+            <a:off x="471431" y="23710871"/>
             <a:ext cx="9769848" cy="844173"/>
           </a:xfrm>
           <a:prstGeom prst="rect">
@@ -5005,6 +4828,36 @@
       <p:pic>
         <p:nvPicPr>
           <p:cNvPr id="18" name="Picture 17" descr="SUSig_Seal_StnfrdOnly_Left.png"/>
+          <p:cNvPicPr>
+            <a:picLocks noChangeAspect="1"/>
+          </p:cNvPicPr>
+          <p:nvPr/>
+        </p:nvPicPr>
+        <p:blipFill>
+          <a:blip r:embed="rId4">
+            <a:extLst>
+              <a:ext uri="{28A0092B-C50C-407E-A947-70E740481C1C}">
+                <a14:useLocalDpi xmlns:a14="http://schemas.microsoft.com/office/drawing/2010/main" val="0"/>
+              </a:ext>
+            </a:extLst>
+          </a:blip>
+          <a:stretch>
+            <a:fillRect/>
+          </a:stretch>
+        </p:blipFill>
+        <p:spPr>
+          <a:xfrm>
+            <a:off x="28109902" y="3180356"/>
+            <a:ext cx="6002095" cy="2256140"/>
+          </a:xfrm>
+          <a:prstGeom prst="rect">
+            <a:avLst/>
+          </a:prstGeom>
+        </p:spPr>
+      </p:pic>
+      <p:pic>
+        <p:nvPicPr>
+          <p:cNvPr id="9" name="Picture 8" descr="Screen Shot 2018-08-11 at 6.37.29 AM.png"/>
           <p:cNvPicPr>
             <a:picLocks noChangeAspect="1"/>
           </p:cNvPicPr>
@@ -5024,68 +4877,8 @@
         </p:blipFill>
         <p:spPr>
           <a:xfrm>
-            <a:off x="28109902" y="3180356"/>
-            <a:ext cx="6002095" cy="2256140"/>
-          </a:xfrm>
-          <a:prstGeom prst="rect">
-            <a:avLst/>
-          </a:prstGeom>
-        </p:spPr>
-      </p:pic>
-      <p:pic>
-        <p:nvPicPr>
-          <p:cNvPr id="9" name="Picture 8" descr="Screen Shot 2018-08-11 at 6.37.29 AM.png"/>
-          <p:cNvPicPr>
-            <a:picLocks noChangeAspect="1"/>
-          </p:cNvPicPr>
-          <p:nvPr/>
-        </p:nvPicPr>
-        <p:blipFill>
-          <a:blip r:embed="rId6">
-            <a:extLst>
-              <a:ext uri="{28A0092B-C50C-407E-A947-70E740481C1C}">
-                <a14:useLocalDpi xmlns:a14="http://schemas.microsoft.com/office/drawing/2010/main" val="0"/>
-              </a:ext>
-            </a:extLst>
-          </a:blip>
-          <a:stretch>
-            <a:fillRect/>
-          </a:stretch>
-        </p:blipFill>
-        <p:spPr>
-          <a:xfrm>
-            <a:off x="11121160" y="5850880"/>
+            <a:off x="11174327" y="6636990"/>
             <a:ext cx="5047134" cy="1869309"/>
-          </a:xfrm>
-          <a:prstGeom prst="rect">
-            <a:avLst/>
-          </a:prstGeom>
-        </p:spPr>
-      </p:pic>
-      <p:pic>
-        <p:nvPicPr>
-          <p:cNvPr id="13" name="Picture 12" descr="Screen Shot 2018-08-11 at 6.37.34 AM.png"/>
-          <p:cNvPicPr>
-            <a:picLocks noChangeAspect="1"/>
-          </p:cNvPicPr>
-          <p:nvPr/>
-        </p:nvPicPr>
-        <p:blipFill>
-          <a:blip r:embed="rId7">
-            <a:extLst>
-              <a:ext uri="{28A0092B-C50C-407E-A947-70E740481C1C}">
-                <a14:useLocalDpi xmlns:a14="http://schemas.microsoft.com/office/drawing/2010/main" val="0"/>
-              </a:ext>
-            </a:extLst>
-          </a:blip>
-          <a:stretch>
-            <a:fillRect/>
-          </a:stretch>
-        </p:blipFill>
-        <p:spPr>
-          <a:xfrm>
-            <a:off x="11911579" y="7896544"/>
-            <a:ext cx="3201061" cy="2055727"/>
           </a:xfrm>
           <a:prstGeom prst="rect">
             <a:avLst/>
@@ -5100,7 +4893,7 @@
         </p:nvGrpSpPr>
         <p:grpSpPr>
           <a:xfrm>
-            <a:off x="34463767" y="6001475"/>
+            <a:off x="34463767" y="6787585"/>
             <a:ext cx="2565400" cy="3872505"/>
             <a:chOff x="34463767" y="6441733"/>
             <a:chExt cx="2565400" cy="3872505"/>
@@ -5115,7 +4908,7 @@
             <p:nvPr/>
           </p:nvPicPr>
           <p:blipFill>
-            <a:blip r:embed="rId8">
+            <a:blip r:embed="rId6">
               <a:extLst>
                 <a:ext uri="{28A0092B-C50C-407E-A947-70E740481C1C}">
                   <a14:useLocalDpi xmlns:a14="http://schemas.microsoft.com/office/drawing/2010/main" val="0"/>
@@ -5145,7 +4938,7 @@
             <p:nvPr/>
           </p:nvPicPr>
           <p:blipFill>
-            <a:blip r:embed="rId9">
+            <a:blip r:embed="rId7">
               <a:extLst>
                 <a:ext uri="{28A0092B-C50C-407E-A947-70E740481C1C}">
                   <a14:useLocalDpi xmlns:a14="http://schemas.microsoft.com/office/drawing/2010/main" val="0"/>
@@ -5175,7 +4968,7 @@
             <p:nvPr/>
           </p:nvPicPr>
           <p:blipFill>
-            <a:blip r:embed="rId10">
+            <a:blip r:embed="rId8">
               <a:extLst>
                 <a:ext uri="{28A0092B-C50C-407E-A947-70E740481C1C}">
                   <a14:useLocalDpi xmlns:a14="http://schemas.microsoft.com/office/drawing/2010/main" val="0"/>
@@ -5206,7 +4999,7 @@
           <p:nvPr/>
         </p:nvPicPr>
         <p:blipFill rotWithShape="1">
-          <a:blip r:embed="rId11">
+          <a:blip r:embed="rId9">
             <a:extLst>
               <a:ext uri="{28A0092B-C50C-407E-A947-70E740481C1C}">
                 <a14:useLocalDpi xmlns:a14="http://schemas.microsoft.com/office/drawing/2010/main" val="0"/>
@@ -5218,8 +5011,8 @@
         </p:blipFill>
         <p:spPr>
           <a:xfrm>
-            <a:off x="17202299" y="6333066"/>
-            <a:ext cx="1838847" cy="3163824"/>
+            <a:off x="17202299" y="6695886"/>
+            <a:ext cx="1483133" cy="2551801"/>
           </a:xfrm>
           <a:prstGeom prst="rect">
             <a:avLst/>
@@ -5235,7 +5028,7 @@
           <p:nvPr/>
         </p:nvPicPr>
         <p:blipFill rotWithShape="1">
-          <a:blip r:embed="rId12">
+          <a:blip r:embed="rId10">
             <a:extLst>
               <a:ext uri="{28A0092B-C50C-407E-A947-70E740481C1C}">
                 <a14:useLocalDpi xmlns:a14="http://schemas.microsoft.com/office/drawing/2010/main" val="0"/>
@@ -5247,8 +5040,8 @@
         </p:blipFill>
         <p:spPr>
           <a:xfrm>
-            <a:off x="19831481" y="6333066"/>
-            <a:ext cx="1675534" cy="3163824"/>
+            <a:off x="19831481" y="6695886"/>
+            <a:ext cx="1351412" cy="2551801"/>
           </a:xfrm>
           <a:prstGeom prst="rect">
             <a:avLst/>
@@ -5257,131 +5050,87 @@
       </p:pic>
       <p:grpSp>
         <p:nvGrpSpPr>
-          <p:cNvPr id="56" name="Group 55"/>
+          <p:cNvPr id="55" name="Group 54"/>
           <p:cNvGrpSpPr/>
           <p:nvPr/>
         </p:nvGrpSpPr>
         <p:grpSpPr>
           <a:xfrm>
-            <a:off x="22583419" y="5869796"/>
-            <a:ext cx="7710314" cy="3897258"/>
+            <a:off x="22583419" y="6655906"/>
+            <a:ext cx="7710314" cy="1907462"/>
             <a:chOff x="22583419" y="5869796"/>
-            <a:chExt cx="7710314" cy="3897258"/>
+            <a:chExt cx="7710314" cy="1907462"/>
           </a:xfrm>
         </p:grpSpPr>
         <p:grpSp>
           <p:nvGrpSpPr>
-            <p:cNvPr id="55" name="Group 54"/>
+            <p:cNvPr id="54" name="Group 53"/>
             <p:cNvGrpSpPr/>
             <p:nvPr/>
           </p:nvGrpSpPr>
           <p:grpSpPr>
             <a:xfrm>
-              <a:off x="22583419" y="5869796"/>
-              <a:ext cx="7710314" cy="1907462"/>
-              <a:chOff x="22583419" y="5869796"/>
-              <a:chExt cx="7710314" cy="1907462"/>
+              <a:off x="22583419" y="5950275"/>
+              <a:ext cx="3108861" cy="1746504"/>
+              <a:chOff x="22583419" y="5968681"/>
+              <a:chExt cx="3108861" cy="1746504"/>
             </a:xfrm>
           </p:grpSpPr>
-          <p:grpSp>
-            <p:nvGrpSpPr>
-              <p:cNvPr id="54" name="Group 53"/>
-              <p:cNvGrpSpPr/>
-              <p:nvPr/>
-            </p:nvGrpSpPr>
-            <p:grpSpPr>
-              <a:xfrm>
-                <a:off x="22583419" y="5950275"/>
-                <a:ext cx="3108861" cy="1746504"/>
-                <a:chOff x="22583419" y="5968681"/>
-                <a:chExt cx="3108861" cy="1746504"/>
-              </a:xfrm>
-            </p:grpSpPr>
-            <p:pic>
-              <p:nvPicPr>
-                <p:cNvPr id="22" name="Picture 21" descr="response-time.png"/>
-                <p:cNvPicPr>
-                  <a:picLocks noChangeAspect="1"/>
-                </p:cNvPicPr>
-                <p:nvPr/>
-              </p:nvPicPr>
-              <p:blipFill>
-                <a:blip r:embed="rId13">
-                  <a:biLevel thresh="75000"/>
-                  <a:extLst>
-                    <a:ext uri="{28A0092B-C50C-407E-A947-70E740481C1C}">
-                      <a14:useLocalDpi xmlns:a14="http://schemas.microsoft.com/office/drawing/2010/main" val="0"/>
-                    </a:ext>
-                  </a:extLst>
-                </a:blip>
-                <a:stretch>
-                  <a:fillRect/>
-                </a:stretch>
-              </p:blipFill>
-              <p:spPr>
-                <a:xfrm>
-                  <a:off x="22583419" y="5968681"/>
-                  <a:ext cx="1292413" cy="1746504"/>
-                </a:xfrm>
-                <a:prstGeom prst="rect">
-                  <a:avLst/>
-                </a:prstGeom>
-              </p:spPr>
-            </p:pic>
-            <p:pic>
-              <p:nvPicPr>
-                <p:cNvPr id="23" name="Picture 22" descr="accuracy.jpg"/>
-                <p:cNvPicPr>
-                  <a:picLocks noChangeAspect="1"/>
-                </p:cNvPicPr>
-                <p:nvPr/>
-              </p:nvPicPr>
-              <p:blipFill>
-                <a:blip r:embed="rId14">
-                  <a:extLst>
-                    <a:ext uri="{28A0092B-C50C-407E-A947-70E740481C1C}">
-                      <a14:useLocalDpi xmlns:a14="http://schemas.microsoft.com/office/drawing/2010/main" val="0"/>
-                    </a:ext>
-                  </a:extLst>
-                </a:blip>
-                <a:stretch>
-                  <a:fillRect/>
-                </a:stretch>
-              </p:blipFill>
-              <p:spPr>
-                <a:xfrm>
-                  <a:off x="23953278" y="5972432"/>
-                  <a:ext cx="1739002" cy="1739002"/>
-                </a:xfrm>
-                <a:prstGeom prst="rect">
-                  <a:avLst/>
-                </a:prstGeom>
-              </p:spPr>
-            </p:pic>
-          </p:grpSp>
           <p:pic>
             <p:nvPicPr>
-              <p:cNvPr id="24" name="Picture 23" descr="hddm-hierarchical-bayesian-estimation-of-the-drift-diffusion-model-in-python_20708267.jpeg"/>
+              <p:cNvPr id="22" name="Picture 21" descr="response-time.png"/>
               <p:cNvPicPr>
                 <a:picLocks noChangeAspect="1"/>
               </p:cNvPicPr>
               <p:nvPr/>
             </p:nvPicPr>
-            <p:blipFill rotWithShape="1">
-              <a:blip r:embed="rId15">
+            <p:blipFill>
+              <a:blip r:embed="rId11">
+                <a:biLevel thresh="75000"/>
                 <a:extLst>
                   <a:ext uri="{28A0092B-C50C-407E-A947-70E740481C1C}">
                     <a14:useLocalDpi xmlns:a14="http://schemas.microsoft.com/office/drawing/2010/main" val="0"/>
                   </a:ext>
                 </a:extLst>
               </a:blip>
-              <a:srcRect l="2467" t="33013" r="3726" b="32488"/>
-              <a:stretch/>
+              <a:stretch>
+                <a:fillRect/>
+              </a:stretch>
             </p:blipFill>
             <p:spPr>
               <a:xfrm>
-                <a:off x="27031882" y="5869796"/>
-                <a:ext cx="3261851" cy="1907462"/>
+                <a:off x="22583419" y="5968681"/>
+                <a:ext cx="1292413" cy="1746504"/>
+              </a:xfrm>
+              <a:prstGeom prst="rect">
+                <a:avLst/>
+              </a:prstGeom>
+            </p:spPr>
+          </p:pic>
+          <p:pic>
+            <p:nvPicPr>
+              <p:cNvPr id="23" name="Picture 22" descr="accuracy.jpg"/>
+              <p:cNvPicPr>
+                <a:picLocks noChangeAspect="1"/>
+              </p:cNvPicPr>
+              <p:nvPr/>
+            </p:nvPicPr>
+            <p:blipFill>
+              <a:blip r:embed="rId12">
+                <a:extLst>
+                  <a:ext uri="{28A0092B-C50C-407E-A947-70E740481C1C}">
+                    <a14:useLocalDpi xmlns:a14="http://schemas.microsoft.com/office/drawing/2010/main" val="0"/>
+                  </a:ext>
+                </a:extLst>
+              </a:blip>
+              <a:stretch>
+                <a:fillRect/>
+              </a:stretch>
+            </p:blipFill>
+            <p:spPr>
+              <a:xfrm>
+                <a:off x="23953278" y="5972432"/>
+                <a:ext cx="1739002" cy="1739002"/>
               </a:xfrm>
               <a:prstGeom prst="rect">
                 <a:avLst/>
@@ -5389,79 +5138,108 @@
             </p:spPr>
           </p:pic>
         </p:grpSp>
-        <p:sp>
-          <p:nvSpPr>
-            <p:cNvPr id="51" name="Right Brace 50"/>
-            <p:cNvSpPr/>
+        <p:pic>
+          <p:nvPicPr>
+            <p:cNvPr id="24" name="Picture 23" descr="hddm-hierarchical-bayesian-estimation-of-the-drift-diffusion-model-in-python_20708267.jpeg"/>
+            <p:cNvPicPr>
+              <a:picLocks noChangeAspect="1"/>
+            </p:cNvPicPr>
             <p:nvPr/>
-          </p:nvSpPr>
-          <p:spPr>
-            <a:xfrm rot="5400000">
-              <a:off x="26035253" y="4862941"/>
-              <a:ext cx="806647" cy="6956656"/>
-            </a:xfrm>
-            <a:prstGeom prst="rightBrace">
-              <a:avLst/>
-            </a:prstGeom>
-            <a:ln w="57150" cmpd="sng">
-              <a:headEnd type="none"/>
-              <a:tailEnd type="none"/>
-            </a:ln>
-          </p:spPr>
-          <p:style>
-            <a:lnRef idx="2">
-              <a:schemeClr val="dk1"/>
-            </a:lnRef>
-            <a:fillRef idx="0">
-              <a:schemeClr val="dk1"/>
-            </a:fillRef>
-            <a:effectRef idx="1">
-              <a:schemeClr val="dk1"/>
-            </a:effectRef>
-            <a:fontRef idx="minor">
-              <a:schemeClr val="tx1"/>
-            </a:fontRef>
-          </p:style>
-          <p:txBody>
-            <a:bodyPr rtlCol="0" anchor="ctr"/>
-            <a:lstStyle/>
-            <a:p>
-              <a:pPr algn="ctr"/>
-              <a:endParaRPr lang="en-US"/>
-            </a:p>
-          </p:txBody>
-        </p:sp>
-        <p:sp>
-          <p:nvSpPr>
-            <p:cNvPr id="53" name="TextBox 52"/>
-            <p:cNvSpPr txBox="1"/>
-            <p:nvPr/>
-          </p:nvSpPr>
+          </p:nvPicPr>
+          <p:blipFill rotWithShape="1">
+            <a:blip r:embed="rId13">
+              <a:extLst>
+                <a:ext uri="{28A0092B-C50C-407E-A947-70E740481C1C}">
+                  <a14:useLocalDpi xmlns:a14="http://schemas.microsoft.com/office/drawing/2010/main" val="0"/>
+                </a:ext>
+              </a:extLst>
+            </a:blip>
+            <a:srcRect l="2467" t="33013" r="3726" b="32488"/>
+            <a:stretch/>
+          </p:blipFill>
           <p:spPr>
             <a:xfrm>
-              <a:off x="24430467" y="8905280"/>
-              <a:ext cx="4016219" cy="861774"/>
+              <a:off x="27031882" y="5869796"/>
+              <a:ext cx="3261851" cy="1907462"/>
             </a:xfrm>
             <a:prstGeom prst="rect">
               <a:avLst/>
             </a:prstGeom>
-            <a:noFill/>
           </p:spPr>
-          <p:txBody>
-            <a:bodyPr wrap="none" rtlCol="0">
-              <a:spAutoFit/>
-            </a:bodyPr>
-            <a:lstStyle/>
-            <a:p>
-              <a:r>
-                <a:rPr lang="en-US" sz="5000" dirty="0" smtClean="0"/>
-                <a:t>Factor analysis</a:t>
-              </a:r>
-              <a:endParaRPr lang="en-US" sz="5000" dirty="0"/>
-            </a:p>
-          </p:txBody>
-        </p:sp>
+        </p:pic>
       </p:grpSp>
+      <p:sp>
+        <p:nvSpPr>
+          <p:cNvPr id="51" name="Right Brace 50"/>
+          <p:cNvSpPr/>
+          <p:nvPr/>
+        </p:nvSpPr>
+        <p:spPr>
+          <a:xfrm rot="5400000">
+            <a:off x="26035253" y="5649051"/>
+            <a:ext cx="806647" cy="6956656"/>
+          </a:xfrm>
+          <a:prstGeom prst="rightBrace">
+            <a:avLst/>
+          </a:prstGeom>
+          <a:ln w="57150" cmpd="sng">
+            <a:headEnd type="none"/>
+            <a:tailEnd type="none"/>
+          </a:ln>
+        </p:spPr>
+        <p:style>
+          <a:lnRef idx="2">
+            <a:schemeClr val="dk1"/>
+          </a:lnRef>
+          <a:fillRef idx="0">
+            <a:schemeClr val="dk1"/>
+          </a:fillRef>
+          <a:effectRef idx="1">
+            <a:schemeClr val="dk1"/>
+          </a:effectRef>
+          <a:fontRef idx="minor">
+            <a:schemeClr val="tx1"/>
+          </a:fontRef>
+        </p:style>
+        <p:txBody>
+          <a:bodyPr rtlCol="0" anchor="ctr"/>
+          <a:lstStyle/>
+          <a:p>
+            <a:pPr algn="ctr"/>
+            <a:endParaRPr lang="en-US"/>
+          </a:p>
+        </p:txBody>
+      </p:sp>
+      <p:sp>
+        <p:nvSpPr>
+          <p:cNvPr id="53" name="TextBox 52"/>
+          <p:cNvSpPr txBox="1"/>
+          <p:nvPr/>
+        </p:nvSpPr>
+        <p:spPr>
+          <a:xfrm>
+            <a:off x="24430467" y="9691390"/>
+            <a:ext cx="4016219" cy="861774"/>
+          </a:xfrm>
+          <a:prstGeom prst="rect">
+            <a:avLst/>
+          </a:prstGeom>
+          <a:noFill/>
+        </p:spPr>
+        <p:txBody>
+          <a:bodyPr wrap="none" rtlCol="0">
+            <a:spAutoFit/>
+          </a:bodyPr>
+          <a:lstStyle/>
+          <a:p>
+            <a:r>
+              <a:rPr lang="en-US" sz="5000" dirty="0" smtClean="0"/>
+              <a:t>Factor analysis</a:t>
+            </a:r>
+            <a:endParaRPr lang="en-US" sz="5000" dirty="0"/>
+          </a:p>
+        </p:txBody>
+      </p:sp>
       <p:cxnSp>
         <p:nvCxnSpPr>
           <p:cNvPr id="59" name="Straight Arrow Connector 58"/>
@@ -5470,7 +5248,7 @@
         </p:nvCxnSpPr>
         <p:spPr>
           <a:xfrm>
-            <a:off x="30852533" y="6688672"/>
+            <a:off x="30852533" y="7474782"/>
             <a:ext cx="3403600" cy="978345"/>
           </a:xfrm>
           <a:prstGeom prst="straightConnector1">
@@ -5503,7 +5281,7 @@
         </p:nvCxnSpPr>
         <p:spPr>
           <a:xfrm flipV="1">
-            <a:off x="30869469" y="7806253"/>
+            <a:off x="30869469" y="8592363"/>
             <a:ext cx="3403600" cy="978345"/>
           </a:xfrm>
           <a:prstGeom prst="straightConnector1">
@@ -5536,7 +5314,7 @@
         </p:nvSpPr>
         <p:spPr>
           <a:xfrm>
-            <a:off x="30593598" y="8884867"/>
+            <a:off x="30593598" y="9670977"/>
             <a:ext cx="2845901" cy="861774"/>
           </a:xfrm>
           <a:prstGeom prst="rect">
@@ -5558,6 +5336,677 @@
           </a:p>
         </p:txBody>
       </p:sp>
+      <p:sp>
+        <p:nvSpPr>
+          <p:cNvPr id="35" name="Text Box 424"/>
+          <p:cNvSpPr txBox="1">
+            <a:spLocks noChangeArrowheads="1"/>
+          </p:cNvSpPr>
+          <p:nvPr/>
+        </p:nvSpPr>
+        <p:spPr bwMode="auto">
+          <a:xfrm>
+            <a:off x="10810241" y="5394944"/>
+            <a:ext cx="26883360" cy="844173"/>
+          </a:xfrm>
+          <a:prstGeom prst="rect">
+            <a:avLst/>
+          </a:prstGeom>
+          <a:solidFill>
+            <a:srgbClr val="A40A1D"/>
+          </a:solidFill>
+          <a:ln w="25400">
+            <a:noFill/>
+            <a:miter lim="800000"/>
+            <a:headEnd/>
+            <a:tailEnd/>
+          </a:ln>
+          <a:effectLst/>
+        </p:spPr>
+        <p:txBody>
+          <a:bodyPr wrap="square" lIns="79230" tIns="39614" rIns="79230" bIns="39614">
+            <a:prstTxWarp prst="textNoShape">
+              <a:avLst/>
+            </a:prstTxWarp>
+            <a:spAutoFit/>
+          </a:bodyPr>
+          <a:lstStyle/>
+          <a:p>
+            <a:pPr algn="ctr">
+              <a:spcBef>
+                <a:spcPct val="50000"/>
+              </a:spcBef>
+            </a:pPr>
+            <a:r>
+              <a:rPr lang="en-US" sz="5000" b="1" dirty="0" smtClean="0">
+                <a:solidFill>
+                  <a:schemeClr val="bg1"/>
+                </a:solidFill>
+                <a:latin typeface="Arial"/>
+                <a:cs typeface="Arial"/>
+              </a:rPr>
+              <a:t>Overview of Procedure</a:t>
+            </a:r>
+            <a:endParaRPr lang="en-US" sz="5000" dirty="0">
+              <a:solidFill>
+                <a:schemeClr val="bg1"/>
+              </a:solidFill>
+              <a:latin typeface="Arial"/>
+              <a:cs typeface="Arial"/>
+            </a:endParaRPr>
+          </a:p>
+        </p:txBody>
+      </p:sp>
+      <p:sp>
+        <p:nvSpPr>
+          <p:cNvPr id="36" name="Text Box 424"/>
+          <p:cNvSpPr txBox="1">
+            <a:spLocks noChangeArrowheads="1"/>
+          </p:cNvSpPr>
+          <p:nvPr/>
+        </p:nvSpPr>
+        <p:spPr bwMode="auto">
+          <a:xfrm>
+            <a:off x="10810241" y="11119204"/>
+            <a:ext cx="12801600" cy="844173"/>
+          </a:xfrm>
+          <a:prstGeom prst="rect">
+            <a:avLst/>
+          </a:prstGeom>
+          <a:solidFill>
+            <a:srgbClr val="A40A1D"/>
+          </a:solidFill>
+          <a:ln w="25400">
+            <a:noFill/>
+            <a:miter lim="800000"/>
+            <a:headEnd/>
+            <a:tailEnd/>
+          </a:ln>
+          <a:effectLst/>
+        </p:spPr>
+        <p:txBody>
+          <a:bodyPr wrap="square" lIns="79230" tIns="39614" rIns="79230" bIns="39614">
+            <a:prstTxWarp prst="textNoShape">
+              <a:avLst/>
+            </a:prstTxWarp>
+            <a:spAutoFit/>
+          </a:bodyPr>
+          <a:lstStyle/>
+          <a:p>
+            <a:pPr algn="ctr">
+              <a:spcBef>
+                <a:spcPct val="50000"/>
+              </a:spcBef>
+            </a:pPr>
+            <a:r>
+              <a:rPr lang="en-US" sz="5000" b="1" dirty="0" smtClean="0">
+                <a:solidFill>
+                  <a:schemeClr val="bg1"/>
+                </a:solidFill>
+                <a:latin typeface="Arial"/>
+                <a:cs typeface="Arial"/>
+              </a:rPr>
+              <a:t>DDM </a:t>
+            </a:r>
+            <a:r>
+              <a:rPr lang="en-US" sz="5000" b="1" dirty="0" err="1" smtClean="0">
+                <a:solidFill>
+                  <a:schemeClr val="bg1"/>
+                </a:solidFill>
+                <a:latin typeface="Arial"/>
+                <a:cs typeface="Arial"/>
+              </a:rPr>
+              <a:t>vs</a:t>
+            </a:r>
+            <a:r>
+              <a:rPr lang="en-US" sz="5000" b="1" dirty="0" smtClean="0">
+                <a:solidFill>
+                  <a:schemeClr val="bg1"/>
+                </a:solidFill>
+                <a:latin typeface="Arial"/>
+                <a:cs typeface="Arial"/>
+              </a:rPr>
+              <a:t> Raw measure reliability</a:t>
+            </a:r>
+            <a:endParaRPr lang="en-US" sz="5000" dirty="0">
+              <a:solidFill>
+                <a:schemeClr val="bg1"/>
+              </a:solidFill>
+              <a:latin typeface="Arial"/>
+              <a:cs typeface="Arial"/>
+            </a:endParaRPr>
+          </a:p>
+        </p:txBody>
+      </p:sp>
+      <p:sp>
+        <p:nvSpPr>
+          <p:cNvPr id="37" name="Text Box 424"/>
+          <p:cNvSpPr txBox="1">
+            <a:spLocks noChangeArrowheads="1"/>
+          </p:cNvSpPr>
+          <p:nvPr/>
+        </p:nvSpPr>
+        <p:spPr bwMode="auto">
+          <a:xfrm>
+            <a:off x="24892000" y="11058734"/>
+            <a:ext cx="12801600" cy="844173"/>
+          </a:xfrm>
+          <a:prstGeom prst="rect">
+            <a:avLst/>
+          </a:prstGeom>
+          <a:solidFill>
+            <a:srgbClr val="A40A1D"/>
+          </a:solidFill>
+          <a:ln w="25400">
+            <a:noFill/>
+            <a:miter lim="800000"/>
+            <a:headEnd/>
+            <a:tailEnd/>
+          </a:ln>
+          <a:effectLst/>
+        </p:spPr>
+        <p:txBody>
+          <a:bodyPr wrap="square" lIns="79230" tIns="39614" rIns="79230" bIns="39614">
+            <a:prstTxWarp prst="textNoShape">
+              <a:avLst/>
+            </a:prstTxWarp>
+            <a:spAutoFit/>
+          </a:bodyPr>
+          <a:lstStyle/>
+          <a:p>
+            <a:pPr algn="ctr">
+              <a:spcBef>
+                <a:spcPct val="50000"/>
+              </a:spcBef>
+            </a:pPr>
+            <a:r>
+              <a:rPr lang="en-US" sz="5000" b="1" dirty="0" smtClean="0">
+                <a:solidFill>
+                  <a:schemeClr val="bg1"/>
+                </a:solidFill>
+                <a:latin typeface="Arial"/>
+                <a:cs typeface="Arial"/>
+              </a:rPr>
+              <a:t>Variance Breakdown</a:t>
+            </a:r>
+            <a:endParaRPr lang="en-US" sz="5000" dirty="0">
+              <a:solidFill>
+                <a:schemeClr val="bg1"/>
+              </a:solidFill>
+              <a:latin typeface="Arial"/>
+              <a:cs typeface="Arial"/>
+            </a:endParaRPr>
+          </a:p>
+        </p:txBody>
+      </p:sp>
+      <p:sp>
+        <p:nvSpPr>
+          <p:cNvPr id="40" name="Right Brace 39"/>
+          <p:cNvSpPr/>
+          <p:nvPr/>
+        </p:nvSpPr>
+        <p:spPr>
+          <a:xfrm rot="5400000">
+            <a:off x="18841479" y="6844963"/>
+            <a:ext cx="813816" cy="4572000"/>
+          </a:xfrm>
+          <a:prstGeom prst="rightBrace">
+            <a:avLst/>
+          </a:prstGeom>
+          <a:ln w="57150" cmpd="sng">
+            <a:headEnd type="none"/>
+            <a:tailEnd type="none"/>
+          </a:ln>
+        </p:spPr>
+        <p:style>
+          <a:lnRef idx="2">
+            <a:schemeClr val="dk1"/>
+          </a:lnRef>
+          <a:fillRef idx="0">
+            <a:schemeClr val="dk1"/>
+          </a:fillRef>
+          <a:effectRef idx="1">
+            <a:schemeClr val="dk1"/>
+          </a:effectRef>
+          <a:fontRef idx="minor">
+            <a:schemeClr val="tx1"/>
+          </a:fontRef>
+        </p:style>
+        <p:txBody>
+          <a:bodyPr rtlCol="0" anchor="ctr"/>
+          <a:lstStyle/>
+          <a:p>
+            <a:pPr algn="ctr"/>
+            <a:endParaRPr lang="en-US"/>
+          </a:p>
+        </p:txBody>
+      </p:sp>
+      <p:sp>
+        <p:nvSpPr>
+          <p:cNvPr id="41" name="TextBox 40"/>
+          <p:cNvSpPr txBox="1"/>
+          <p:nvPr/>
+        </p:nvSpPr>
+        <p:spPr>
+          <a:xfrm>
+            <a:off x="17880070" y="9722850"/>
+            <a:ext cx="2736634" cy="861774"/>
+          </a:xfrm>
+          <a:prstGeom prst="rect">
+            <a:avLst/>
+          </a:prstGeom>
+          <a:noFill/>
+        </p:spPr>
+        <p:txBody>
+          <a:bodyPr wrap="none" rtlCol="0">
+            <a:spAutoFit/>
+          </a:bodyPr>
+          <a:lstStyle/>
+          <a:p>
+            <a:r>
+              <a:rPr lang="en-US" sz="5000" dirty="0" smtClean="0"/>
+              <a:t>Reliability</a:t>
+            </a:r>
+            <a:endParaRPr lang="en-US" sz="5000" dirty="0"/>
+          </a:p>
+        </p:txBody>
+      </p:sp>
+      <p:pic>
+        <p:nvPicPr>
+          <p:cNvPr id="2" name="Picture 1" descr="Screen Shot 2018-09-21 at 10.28.04 AM.png"/>
+          <p:cNvPicPr>
+            <a:picLocks noChangeAspect="1"/>
+          </p:cNvPicPr>
+          <p:nvPr/>
+        </p:nvPicPr>
+        <p:blipFill>
+          <a:blip r:embed="rId14">
+            <a:extLst>
+              <a:ext uri="{28A0092B-C50C-407E-A947-70E740481C1C}">
+                <a14:useLocalDpi xmlns:a14="http://schemas.microsoft.com/office/drawing/2010/main" val="0"/>
+              </a:ext>
+            </a:extLst>
+          </a:blip>
+          <a:stretch>
+            <a:fillRect/>
+          </a:stretch>
+        </p:blipFill>
+        <p:spPr>
+          <a:xfrm>
+            <a:off x="10810241" y="8575060"/>
+            <a:ext cx="5775307" cy="1874520"/>
+          </a:xfrm>
+          <a:prstGeom prst="rect">
+            <a:avLst/>
+          </a:prstGeom>
+        </p:spPr>
+      </p:pic>
+      <p:sp>
+        <p:nvSpPr>
+          <p:cNvPr id="42" name="Text Box 424"/>
+          <p:cNvSpPr txBox="1">
+            <a:spLocks noChangeArrowheads="1"/>
+          </p:cNvSpPr>
+          <p:nvPr/>
+        </p:nvSpPr>
+        <p:spPr bwMode="auto">
+          <a:xfrm>
+            <a:off x="10810241" y="17105734"/>
+            <a:ext cx="12801600" cy="844173"/>
+          </a:xfrm>
+          <a:prstGeom prst="rect">
+            <a:avLst/>
+          </a:prstGeom>
+          <a:solidFill>
+            <a:srgbClr val="A40A1D"/>
+          </a:solidFill>
+          <a:ln w="25400">
+            <a:noFill/>
+            <a:miter lim="800000"/>
+            <a:headEnd/>
+            <a:tailEnd/>
+          </a:ln>
+          <a:effectLst/>
+        </p:spPr>
+        <p:txBody>
+          <a:bodyPr wrap="square" lIns="79230" tIns="39614" rIns="79230" bIns="39614">
+            <a:prstTxWarp prst="textNoShape">
+              <a:avLst/>
+            </a:prstTxWarp>
+            <a:spAutoFit/>
+          </a:bodyPr>
+          <a:lstStyle/>
+          <a:p>
+            <a:pPr algn="ctr">
+              <a:spcBef>
+                <a:spcPct val="50000"/>
+              </a:spcBef>
+            </a:pPr>
+            <a:r>
+              <a:rPr lang="en-US" sz="5000" b="1" dirty="0" smtClean="0">
+                <a:solidFill>
+                  <a:schemeClr val="bg1"/>
+                </a:solidFill>
+                <a:latin typeface="Arial"/>
+                <a:cs typeface="Arial"/>
+              </a:rPr>
+              <a:t>Sample size effects</a:t>
+            </a:r>
+            <a:endParaRPr lang="en-US" sz="5000" dirty="0">
+              <a:solidFill>
+                <a:schemeClr val="bg1"/>
+              </a:solidFill>
+              <a:latin typeface="Arial"/>
+              <a:cs typeface="Arial"/>
+            </a:endParaRPr>
+          </a:p>
+        </p:txBody>
+      </p:sp>
+      <p:sp>
+        <p:nvSpPr>
+          <p:cNvPr id="43" name="Text Box 424"/>
+          <p:cNvSpPr txBox="1">
+            <a:spLocks noChangeArrowheads="1"/>
+          </p:cNvSpPr>
+          <p:nvPr/>
+        </p:nvSpPr>
+        <p:spPr bwMode="auto">
+          <a:xfrm>
+            <a:off x="24892000" y="17105734"/>
+            <a:ext cx="12801600" cy="844173"/>
+          </a:xfrm>
+          <a:prstGeom prst="rect">
+            <a:avLst/>
+          </a:prstGeom>
+          <a:solidFill>
+            <a:srgbClr val="A40A1D"/>
+          </a:solidFill>
+          <a:ln w="25400">
+            <a:noFill/>
+            <a:miter lim="800000"/>
+            <a:headEnd/>
+            <a:tailEnd/>
+          </a:ln>
+          <a:effectLst/>
+        </p:spPr>
+        <p:txBody>
+          <a:bodyPr wrap="square" lIns="79230" tIns="39614" rIns="79230" bIns="39614">
+            <a:prstTxWarp prst="textNoShape">
+              <a:avLst/>
+            </a:prstTxWarp>
+            <a:spAutoFit/>
+          </a:bodyPr>
+          <a:lstStyle/>
+          <a:p>
+            <a:pPr algn="ctr">
+              <a:spcBef>
+                <a:spcPct val="50000"/>
+              </a:spcBef>
+            </a:pPr>
+            <a:r>
+              <a:rPr lang="en-US" sz="5000" b="1" dirty="0" smtClean="0">
+                <a:solidFill>
+                  <a:schemeClr val="bg1"/>
+                </a:solidFill>
+                <a:latin typeface="Arial"/>
+                <a:cs typeface="Arial"/>
+              </a:rPr>
+              <a:t>Analysis of hierarchical estimates</a:t>
+            </a:r>
+            <a:endParaRPr lang="en-US" sz="5000" dirty="0">
+              <a:solidFill>
+                <a:schemeClr val="bg1"/>
+              </a:solidFill>
+              <a:latin typeface="Arial"/>
+              <a:cs typeface="Arial"/>
+            </a:endParaRPr>
+          </a:p>
+        </p:txBody>
+      </p:sp>
+      <p:sp>
+        <p:nvSpPr>
+          <p:cNvPr id="45" name="Text Box 424"/>
+          <p:cNvSpPr txBox="1">
+            <a:spLocks noChangeArrowheads="1"/>
+          </p:cNvSpPr>
+          <p:nvPr/>
+        </p:nvSpPr>
+        <p:spPr bwMode="auto">
+          <a:xfrm>
+            <a:off x="10801499" y="23812632"/>
+            <a:ext cx="12801600" cy="844173"/>
+          </a:xfrm>
+          <a:prstGeom prst="rect">
+            <a:avLst/>
+          </a:prstGeom>
+          <a:solidFill>
+            <a:srgbClr val="A40A1D"/>
+          </a:solidFill>
+          <a:ln w="25400">
+            <a:noFill/>
+            <a:miter lim="800000"/>
+            <a:headEnd/>
+            <a:tailEnd/>
+          </a:ln>
+          <a:effectLst/>
+        </p:spPr>
+        <p:txBody>
+          <a:bodyPr wrap="square" lIns="79230" tIns="39614" rIns="79230" bIns="39614">
+            <a:prstTxWarp prst="textNoShape">
+              <a:avLst/>
+            </a:prstTxWarp>
+            <a:spAutoFit/>
+          </a:bodyPr>
+          <a:lstStyle/>
+          <a:p>
+            <a:pPr algn="ctr">
+              <a:spcBef>
+                <a:spcPct val="50000"/>
+              </a:spcBef>
+            </a:pPr>
+            <a:r>
+              <a:rPr lang="en-US" sz="5000" b="1" dirty="0" smtClean="0">
+                <a:solidFill>
+                  <a:schemeClr val="bg1"/>
+                </a:solidFill>
+                <a:latin typeface="Arial"/>
+                <a:cs typeface="Arial"/>
+              </a:rPr>
+              <a:t>Clustering</a:t>
+            </a:r>
+            <a:endParaRPr lang="en-US" sz="5000" dirty="0">
+              <a:solidFill>
+                <a:schemeClr val="bg1"/>
+              </a:solidFill>
+              <a:latin typeface="Arial"/>
+              <a:cs typeface="Arial"/>
+            </a:endParaRPr>
+          </a:p>
+        </p:txBody>
+      </p:sp>
+      <p:sp>
+        <p:nvSpPr>
+          <p:cNvPr id="46" name="Text Box 424"/>
+          <p:cNvSpPr txBox="1">
+            <a:spLocks noChangeArrowheads="1"/>
+          </p:cNvSpPr>
+          <p:nvPr/>
+        </p:nvSpPr>
+        <p:spPr bwMode="auto">
+          <a:xfrm>
+            <a:off x="24883258" y="23812632"/>
+            <a:ext cx="12801600" cy="844173"/>
+          </a:xfrm>
+          <a:prstGeom prst="rect">
+            <a:avLst/>
+          </a:prstGeom>
+          <a:solidFill>
+            <a:srgbClr val="A40A1D"/>
+          </a:solidFill>
+          <a:ln w="25400">
+            <a:noFill/>
+            <a:miter lim="800000"/>
+            <a:headEnd/>
+            <a:tailEnd/>
+          </a:ln>
+          <a:effectLst/>
+        </p:spPr>
+        <p:txBody>
+          <a:bodyPr wrap="square" lIns="79230" tIns="39614" rIns="79230" bIns="39614">
+            <a:prstTxWarp prst="textNoShape">
+              <a:avLst/>
+            </a:prstTxWarp>
+            <a:spAutoFit/>
+          </a:bodyPr>
+          <a:lstStyle/>
+          <a:p>
+            <a:pPr algn="ctr">
+              <a:spcBef>
+                <a:spcPct val="50000"/>
+              </a:spcBef>
+            </a:pPr>
+            <a:r>
+              <a:rPr lang="en-US" sz="5000" b="1" dirty="0" smtClean="0">
+                <a:solidFill>
+                  <a:schemeClr val="bg1"/>
+                </a:solidFill>
+                <a:latin typeface="Arial"/>
+                <a:cs typeface="Arial"/>
+              </a:rPr>
+              <a:t>Prediction</a:t>
+            </a:r>
+            <a:endParaRPr lang="en-US" sz="5000" dirty="0">
+              <a:solidFill>
+                <a:schemeClr val="bg1"/>
+              </a:solidFill>
+              <a:latin typeface="Arial"/>
+              <a:cs typeface="Arial"/>
+            </a:endParaRPr>
+          </a:p>
+        </p:txBody>
+      </p:sp>
+      <p:sp>
+        <p:nvSpPr>
+          <p:cNvPr id="50" name="TextBox 49"/>
+          <p:cNvSpPr txBox="1"/>
+          <p:nvPr/>
+        </p:nvSpPr>
+        <p:spPr>
+          <a:xfrm>
+            <a:off x="18418431" y="7595722"/>
+            <a:ext cx="1584263" cy="677108"/>
+          </a:xfrm>
+          <a:prstGeom prst="rect">
+            <a:avLst/>
+          </a:prstGeom>
+          <a:noFill/>
+        </p:spPr>
+        <p:txBody>
+          <a:bodyPr wrap="none" rtlCol="0">
+            <a:spAutoFit/>
+          </a:bodyPr>
+          <a:lstStyle/>
+          <a:p>
+            <a:r>
+              <a:rPr lang="en-US" sz="3800" dirty="0" smtClean="0"/>
+              <a:t>2-4 </a:t>
+            </a:r>
+            <a:r>
+              <a:rPr lang="en-US" sz="3800" dirty="0" err="1" smtClean="0"/>
+              <a:t>mo</a:t>
+            </a:r>
+            <a:endParaRPr lang="en-US" sz="3800" dirty="0"/>
+          </a:p>
+        </p:txBody>
+      </p:sp>
+      <p:sp>
+        <p:nvSpPr>
+          <p:cNvPr id="58" name="TextBox 57"/>
+          <p:cNvSpPr txBox="1"/>
+          <p:nvPr/>
+        </p:nvSpPr>
+        <p:spPr>
+          <a:xfrm>
+            <a:off x="23409231" y="8352822"/>
+            <a:ext cx="1908107" cy="677108"/>
+          </a:xfrm>
+          <a:prstGeom prst="rect">
+            <a:avLst/>
+          </a:prstGeom>
+          <a:noFill/>
+        </p:spPr>
+        <p:txBody>
+          <a:bodyPr wrap="none" rtlCol="0">
+            <a:spAutoFit/>
+          </a:bodyPr>
+          <a:lstStyle/>
+          <a:p>
+            <a:r>
+              <a:rPr lang="en-US" sz="3800" dirty="0" smtClean="0"/>
+              <a:t>Raw DVs</a:t>
+            </a:r>
+          </a:p>
+        </p:txBody>
+      </p:sp>
+      <p:sp>
+        <p:nvSpPr>
+          <p:cNvPr id="60" name="TextBox 59"/>
+          <p:cNvSpPr txBox="1"/>
+          <p:nvPr/>
+        </p:nvSpPr>
+        <p:spPr>
+          <a:xfrm>
+            <a:off x="27432351" y="8352822"/>
+            <a:ext cx="2078000" cy="677108"/>
+          </a:xfrm>
+          <a:prstGeom prst="rect">
+            <a:avLst/>
+          </a:prstGeom>
+          <a:noFill/>
+        </p:spPr>
+        <p:txBody>
+          <a:bodyPr wrap="none" rtlCol="0">
+            <a:spAutoFit/>
+          </a:bodyPr>
+          <a:lstStyle/>
+          <a:p>
+            <a:r>
+              <a:rPr lang="en-US" sz="3800" dirty="0" smtClean="0"/>
+              <a:t>DDM DVs</a:t>
+            </a:r>
+          </a:p>
+        </p:txBody>
+      </p:sp>
+      <p:pic>
+        <p:nvPicPr>
+          <p:cNvPr id="6" name="Picture 5" descr="Boot_ddm_plot.jpeg"/>
+          <p:cNvPicPr>
+            <a:picLocks noChangeAspect="1"/>
+          </p:cNvPicPr>
+          <p:nvPr/>
+        </p:nvPicPr>
+        <p:blipFill>
+          <a:blip r:embed="rId15">
+            <a:extLst>
+              <a:ext uri="{28A0092B-C50C-407E-A947-70E740481C1C}">
+                <a14:useLocalDpi xmlns:a14="http://schemas.microsoft.com/office/drawing/2010/main" val="0"/>
+              </a:ext>
+            </a:extLst>
+          </a:blip>
+          <a:stretch>
+            <a:fillRect/>
+          </a:stretch>
+        </p:blipFill>
+        <p:spPr>
+          <a:xfrm>
+            <a:off x="10810242" y="11998029"/>
+            <a:ext cx="12801600" cy="2695074"/>
+          </a:xfrm>
+          <a:prstGeom prst="rect">
+            <a:avLst/>
+          </a:prstGeom>
+        </p:spPr>
+      </p:pic>
     </p:spTree>
   </p:cSld>
   <p:clrMapOvr>

</xml_diff>

<commit_message>
update sample size analyses
</commit_message>
<xml_diff>
--- a/presentations/NeuroeconPoster2018.pptx
+++ b/presentations/NeuroeconPoster2018.pptx
@@ -6000,6 +6000,36 @@
         <p:spPr>
           <a:xfrm>
             <a:off x="10810242" y="11998029"/>
+            <a:ext cx="12801600" cy="2695074"/>
+          </a:xfrm>
+          <a:prstGeom prst="rect">
+            <a:avLst/>
+          </a:prstGeom>
+        </p:spPr>
+      </p:pic>
+      <p:pic>
+        <p:nvPicPr>
+          <p:cNvPr id="8" name="Picture 7" descr="var_subs_ddm_plot.jpeg"/>
+          <p:cNvPicPr>
+            <a:picLocks noChangeAspect="1"/>
+          </p:cNvPicPr>
+          <p:nvPr/>
+        </p:nvPicPr>
+        <p:blipFill>
+          <a:blip r:embed="rId16">
+            <a:extLst>
+              <a:ext uri="{28A0092B-C50C-407E-A947-70E740481C1C}">
+                <a14:useLocalDpi xmlns:a14="http://schemas.microsoft.com/office/drawing/2010/main" val="0"/>
+              </a:ext>
+            </a:extLst>
+          </a:blip>
+          <a:stretch>
+            <a:fillRect/>
+          </a:stretch>
+        </p:blipFill>
+        <p:spPr>
+          <a:xfrm>
+            <a:off x="24883258" y="11998029"/>
             <a:ext cx="12801600" cy="2695074"/>
           </a:xfrm>
           <a:prstGeom prst="rect">

</xml_diff>

<commit_message>
debug sample size analyses
</commit_message>
<xml_diff>
--- a/presentations/NeuroeconPoster2018.pptx
+++ b/presentations/NeuroeconPoster2018.pptx
@@ -4114,6 +4114,8 @@
               <a:solidFill>
                 <a:schemeClr val="tx1"/>
               </a:solidFill>
+              <a:latin typeface="Arial"/>
+              <a:cs typeface="Arial"/>
             </a:endParaRPr>
           </a:p>
         </p:txBody>
@@ -4571,6 +4573,8 @@
                 <a:solidFill>
                   <a:schemeClr val="bg1"/>
                 </a:solidFill>
+                <a:latin typeface="Arial"/>
+                <a:cs typeface="Arial"/>
               </a:rPr>
               <a:t>Contact: </a:t>
             </a:r>
@@ -4579,6 +4583,8 @@
                 <a:solidFill>
                   <a:schemeClr val="bg1"/>
                 </a:solidFill>
+                <a:latin typeface="Arial"/>
+                <a:cs typeface="Arial"/>
               </a:rPr>
               <a:t>A. Zeynep </a:t>
             </a:r>
@@ -4587,6 +4593,8 @@
                 <a:solidFill>
                   <a:schemeClr val="bg1"/>
                 </a:solidFill>
+                <a:latin typeface="Arial"/>
+                <a:cs typeface="Arial"/>
               </a:rPr>
               <a:t>Enkavi </a:t>
             </a:r>
@@ -4595,6 +4603,8 @@
                 <a:solidFill>
                   <a:schemeClr val="bg1"/>
                 </a:solidFill>
+                <a:latin typeface="Arial"/>
+                <a:cs typeface="Arial"/>
               </a:rPr>
               <a:t>&lt;</a:t>
             </a:r>
@@ -4603,6 +4613,8 @@
                 <a:solidFill>
                   <a:schemeClr val="bg1"/>
                 </a:solidFill>
+                <a:latin typeface="Arial"/>
+                <a:cs typeface="Arial"/>
               </a:rPr>
               <a:t>zenkavi@stanford.edu</a:t>
             </a:r>
@@ -4611,6 +4623,8 @@
                 <a:solidFill>
                   <a:schemeClr val="bg1"/>
                 </a:solidFill>
+                <a:latin typeface="Arial"/>
+                <a:cs typeface="Arial"/>
               </a:rPr>
               <a:t>&gt;</a:t>
             </a:r>
@@ -4720,6 +4734,8 @@
               <a:solidFill>
                 <a:schemeClr val="tx1"/>
               </a:solidFill>
+              <a:latin typeface="Arial"/>
+              <a:cs typeface="Arial"/>
             </a:endParaRPr>
           </a:p>
         </p:txBody>
@@ -5206,7 +5222,10 @@
           <a:lstStyle/>
           <a:p>
             <a:pPr algn="ctr"/>
-            <a:endParaRPr lang="en-US"/>
+            <a:endParaRPr lang="en-US">
+              <a:latin typeface="Arial"/>
+              <a:cs typeface="Arial"/>
+            </a:endParaRPr>
           </a:p>
         </p:txBody>
       </p:sp>
@@ -5218,8 +5237,8 @@
         </p:nvSpPr>
         <p:spPr>
           <a:xfrm>
-            <a:off x="24430467" y="9691390"/>
-            <a:ext cx="4016219" cy="861774"/>
+            <a:off x="24430467" y="9696913"/>
+            <a:ext cx="4496493" cy="861774"/>
           </a:xfrm>
           <a:prstGeom prst="rect">
             <a:avLst/>
@@ -5233,10 +5252,16 @@
           <a:lstStyle/>
           <a:p>
             <a:r>
-              <a:rPr lang="en-US" sz="5000" dirty="0" smtClean="0"/>
+              <a:rPr lang="en-US" sz="5000" dirty="0" smtClean="0">
+                <a:latin typeface="Arial"/>
+                <a:cs typeface="Arial"/>
+              </a:rPr>
               <a:t>Factor analysis</a:t>
             </a:r>
-            <a:endParaRPr lang="en-US" sz="5000" dirty="0"/>
+            <a:endParaRPr lang="en-US" sz="5000" dirty="0">
+              <a:latin typeface="Arial"/>
+              <a:cs typeface="Arial"/>
+            </a:endParaRPr>
           </a:p>
         </p:txBody>
       </p:sp>
@@ -5314,8 +5339,8 @@
         </p:nvSpPr>
         <p:spPr>
           <a:xfrm>
-            <a:off x="30593598" y="9670977"/>
-            <a:ext cx="2845901" cy="861774"/>
+            <a:off x="30593598" y="9696913"/>
+            <a:ext cx="3035945" cy="861774"/>
           </a:xfrm>
           <a:prstGeom prst="rect">
             <a:avLst/>
@@ -5329,10 +5354,16 @@
           <a:lstStyle/>
           <a:p>
             <a:r>
-              <a:rPr lang="en-US" sz="5000" dirty="0" smtClean="0"/>
+              <a:rPr lang="en-US" sz="5000" dirty="0" smtClean="0">
+                <a:latin typeface="Arial"/>
+                <a:cs typeface="Arial"/>
+              </a:rPr>
               <a:t>Prediction</a:t>
             </a:r>
-            <a:endParaRPr lang="en-US" sz="5000" dirty="0"/>
+            <a:endParaRPr lang="en-US" sz="5000" dirty="0">
+              <a:latin typeface="Arial"/>
+              <a:cs typeface="Arial"/>
+            </a:endParaRPr>
           </a:p>
         </p:txBody>
       </p:sp>
@@ -5386,148 +5417,6 @@
                 <a:cs typeface="Arial"/>
               </a:rPr>
               <a:t>Overview of Procedure</a:t>
-            </a:r>
-            <a:endParaRPr lang="en-US" sz="5000" dirty="0">
-              <a:solidFill>
-                <a:schemeClr val="bg1"/>
-              </a:solidFill>
-              <a:latin typeface="Arial"/>
-              <a:cs typeface="Arial"/>
-            </a:endParaRPr>
-          </a:p>
-        </p:txBody>
-      </p:sp>
-      <p:sp>
-        <p:nvSpPr>
-          <p:cNvPr id="36" name="Text Box 424"/>
-          <p:cNvSpPr txBox="1">
-            <a:spLocks noChangeArrowheads="1"/>
-          </p:cNvSpPr>
-          <p:nvPr/>
-        </p:nvSpPr>
-        <p:spPr bwMode="auto">
-          <a:xfrm>
-            <a:off x="10810241" y="11119204"/>
-            <a:ext cx="12801600" cy="844173"/>
-          </a:xfrm>
-          <a:prstGeom prst="rect">
-            <a:avLst/>
-          </a:prstGeom>
-          <a:solidFill>
-            <a:srgbClr val="A40A1D"/>
-          </a:solidFill>
-          <a:ln w="25400">
-            <a:noFill/>
-            <a:miter lim="800000"/>
-            <a:headEnd/>
-            <a:tailEnd/>
-          </a:ln>
-          <a:effectLst/>
-        </p:spPr>
-        <p:txBody>
-          <a:bodyPr wrap="square" lIns="79230" tIns="39614" rIns="79230" bIns="39614">
-            <a:prstTxWarp prst="textNoShape">
-              <a:avLst/>
-            </a:prstTxWarp>
-            <a:spAutoFit/>
-          </a:bodyPr>
-          <a:lstStyle/>
-          <a:p>
-            <a:pPr algn="ctr">
-              <a:spcBef>
-                <a:spcPct val="50000"/>
-              </a:spcBef>
-            </a:pPr>
-            <a:r>
-              <a:rPr lang="en-US" sz="5000" b="1" dirty="0" smtClean="0">
-                <a:solidFill>
-                  <a:schemeClr val="bg1"/>
-                </a:solidFill>
-                <a:latin typeface="Arial"/>
-                <a:cs typeface="Arial"/>
-              </a:rPr>
-              <a:t>DDM </a:t>
-            </a:r>
-            <a:r>
-              <a:rPr lang="en-US" sz="5000" b="1" dirty="0" err="1" smtClean="0">
-                <a:solidFill>
-                  <a:schemeClr val="bg1"/>
-                </a:solidFill>
-                <a:latin typeface="Arial"/>
-                <a:cs typeface="Arial"/>
-              </a:rPr>
-              <a:t>vs</a:t>
-            </a:r>
-            <a:r>
-              <a:rPr lang="en-US" sz="5000" b="1" dirty="0" smtClean="0">
-                <a:solidFill>
-                  <a:schemeClr val="bg1"/>
-                </a:solidFill>
-                <a:latin typeface="Arial"/>
-                <a:cs typeface="Arial"/>
-              </a:rPr>
-              <a:t> Raw measure reliability</a:t>
-            </a:r>
-            <a:endParaRPr lang="en-US" sz="5000" dirty="0">
-              <a:solidFill>
-                <a:schemeClr val="bg1"/>
-              </a:solidFill>
-              <a:latin typeface="Arial"/>
-              <a:cs typeface="Arial"/>
-            </a:endParaRPr>
-          </a:p>
-        </p:txBody>
-      </p:sp>
-      <p:sp>
-        <p:nvSpPr>
-          <p:cNvPr id="37" name="Text Box 424"/>
-          <p:cNvSpPr txBox="1">
-            <a:spLocks noChangeArrowheads="1"/>
-          </p:cNvSpPr>
-          <p:nvPr/>
-        </p:nvSpPr>
-        <p:spPr bwMode="auto">
-          <a:xfrm>
-            <a:off x="24892000" y="11058734"/>
-            <a:ext cx="12801600" cy="844173"/>
-          </a:xfrm>
-          <a:prstGeom prst="rect">
-            <a:avLst/>
-          </a:prstGeom>
-          <a:solidFill>
-            <a:srgbClr val="A40A1D"/>
-          </a:solidFill>
-          <a:ln w="25400">
-            <a:noFill/>
-            <a:miter lim="800000"/>
-            <a:headEnd/>
-            <a:tailEnd/>
-          </a:ln>
-          <a:effectLst/>
-        </p:spPr>
-        <p:txBody>
-          <a:bodyPr wrap="square" lIns="79230" tIns="39614" rIns="79230" bIns="39614">
-            <a:prstTxWarp prst="textNoShape">
-              <a:avLst/>
-            </a:prstTxWarp>
-            <a:spAutoFit/>
-          </a:bodyPr>
-          <a:lstStyle/>
-          <a:p>
-            <a:pPr algn="ctr">
-              <a:spcBef>
-                <a:spcPct val="50000"/>
-              </a:spcBef>
-            </a:pPr>
-            <a:r>
-              <a:rPr lang="en-US" sz="5000" b="1" dirty="0" smtClean="0">
-                <a:solidFill>
-                  <a:schemeClr val="bg1"/>
-                </a:solidFill>
-                <a:latin typeface="Arial"/>
-                <a:cs typeface="Arial"/>
-              </a:rPr>
-              <a:t>Variance Breakdown</a:t>
             </a:r>
             <a:endParaRPr lang="en-US" sz="5000" dirty="0">
               <a:solidFill>
@@ -5577,7 +5466,10 @@
           <a:lstStyle/>
           <a:p>
             <a:pPr algn="ctr"/>
-            <a:endParaRPr lang="en-US"/>
+            <a:endParaRPr lang="en-US">
+              <a:latin typeface="Arial"/>
+              <a:cs typeface="Arial"/>
+            </a:endParaRPr>
           </a:p>
         </p:txBody>
       </p:sp>
@@ -5589,8 +5481,8 @@
         </p:nvSpPr>
         <p:spPr>
           <a:xfrm>
-            <a:off x="17880070" y="9722850"/>
-            <a:ext cx="2736634" cy="861774"/>
+            <a:off x="17880070" y="9696913"/>
+            <a:ext cx="2929007" cy="861774"/>
           </a:xfrm>
           <a:prstGeom prst="rect">
             <a:avLst/>
@@ -5604,10 +5496,16 @@
           <a:lstStyle/>
           <a:p>
             <a:r>
-              <a:rPr lang="en-US" sz="5000" dirty="0" smtClean="0"/>
+              <a:rPr lang="en-US" sz="5000" dirty="0" smtClean="0">
+                <a:latin typeface="Arial"/>
+                <a:cs typeface="Arial"/>
+              </a:rPr>
               <a:t>Reliability</a:t>
             </a:r>
-            <a:endParaRPr lang="en-US" sz="5000" dirty="0"/>
+            <a:endParaRPr lang="en-US" sz="5000" dirty="0">
+              <a:latin typeface="Arial"/>
+              <a:cs typeface="Arial"/>
+            </a:endParaRPr>
           </a:p>
         </p:txBody>
       </p:sp>
@@ -5651,7 +5549,7 @@
         </p:nvSpPr>
         <p:spPr bwMode="auto">
           <a:xfrm>
-            <a:off x="10810241" y="17105734"/>
+            <a:off x="10810241" y="16501034"/>
             <a:ext cx="12801600" cy="844173"/>
           </a:xfrm>
           <a:prstGeom prst="rect">
@@ -5712,7 +5610,7 @@
         </p:nvSpPr>
         <p:spPr bwMode="auto">
           <a:xfrm>
-            <a:off x="24892000" y="17105734"/>
+            <a:off x="24892000" y="16501034"/>
             <a:ext cx="12801600" cy="844173"/>
           </a:xfrm>
           <a:prstGeom prst="rect">
@@ -5894,7 +5792,7 @@
         <p:spPr>
           <a:xfrm>
             <a:off x="18418431" y="7595722"/>
-            <a:ext cx="1584263" cy="677108"/>
+            <a:ext cx="1701332" cy="677108"/>
           </a:xfrm>
           <a:prstGeom prst="rect">
             <a:avLst/>
@@ -5908,14 +5806,23 @@
           <a:lstStyle/>
           <a:p>
             <a:r>
-              <a:rPr lang="en-US" sz="3800" dirty="0" smtClean="0"/>
+              <a:rPr lang="en-US" sz="3800" dirty="0" smtClean="0">
+                <a:latin typeface="Arial"/>
+                <a:cs typeface="Arial"/>
+              </a:rPr>
               <a:t>2-4 </a:t>
             </a:r>
             <a:r>
-              <a:rPr lang="en-US" sz="3800" dirty="0" err="1" smtClean="0"/>
+              <a:rPr lang="en-US" sz="3800" dirty="0" err="1" smtClean="0">
+                <a:latin typeface="Arial"/>
+                <a:cs typeface="Arial"/>
+              </a:rPr>
               <a:t>mo</a:t>
             </a:r>
-            <a:endParaRPr lang="en-US" sz="3800" dirty="0"/>
+            <a:endParaRPr lang="en-US" sz="3800" dirty="0">
+              <a:latin typeface="Arial"/>
+              <a:cs typeface="Arial"/>
+            </a:endParaRPr>
           </a:p>
         </p:txBody>
       </p:sp>
@@ -5928,7 +5835,7 @@
         <p:spPr>
           <a:xfrm>
             <a:off x="23409231" y="8352822"/>
-            <a:ext cx="1908107" cy="677108"/>
+            <a:ext cx="2215533" cy="677108"/>
           </a:xfrm>
           <a:prstGeom prst="rect">
             <a:avLst/>
@@ -5942,7 +5849,10 @@
           <a:lstStyle/>
           <a:p>
             <a:r>
-              <a:rPr lang="en-US" sz="3800" dirty="0" smtClean="0"/>
+              <a:rPr lang="en-US" sz="3800" dirty="0" smtClean="0">
+                <a:latin typeface="Arial"/>
+                <a:cs typeface="Arial"/>
+              </a:rPr>
               <a:t>Raw DVs</a:t>
             </a:r>
           </a:p>
@@ -5957,7 +5867,7 @@
         <p:spPr>
           <a:xfrm>
             <a:off x="27432351" y="8352822"/>
-            <a:ext cx="2078000" cy="677108"/>
+            <a:ext cx="2350448" cy="677108"/>
           </a:xfrm>
           <a:prstGeom prst="rect">
             <a:avLst/>
@@ -5971,7 +5881,10 @@
           <a:lstStyle/>
           <a:p>
             <a:r>
-              <a:rPr lang="en-US" sz="3800" dirty="0" smtClean="0"/>
+              <a:rPr lang="en-US" sz="3800" dirty="0" smtClean="0">
+                <a:latin typeface="Arial"/>
+                <a:cs typeface="Arial"/>
+              </a:rPr>
               <a:t>DDM DVs</a:t>
             </a:r>
           </a:p>
@@ -5999,44 +5912,172 @@
         </p:blipFill>
         <p:spPr>
           <a:xfrm>
-            <a:off x="10810242" y="11998029"/>
-            <a:ext cx="12801600" cy="2695074"/>
+            <a:off x="11174328" y="11998029"/>
+            <a:ext cx="18742578" cy="3945806"/>
           </a:xfrm>
           <a:prstGeom prst="rect">
             <a:avLst/>
           </a:prstGeom>
         </p:spPr>
       </p:pic>
-      <p:pic>
-        <p:nvPicPr>
-          <p:cNvPr id="8" name="Picture 7" descr="var_subs_ddm_plot.jpeg"/>
-          <p:cNvPicPr>
-            <a:picLocks noChangeAspect="1"/>
-          </p:cNvPicPr>
+      <p:sp>
+        <p:nvSpPr>
+          <p:cNvPr id="61" name="Text Box 424"/>
+          <p:cNvSpPr txBox="1">
+            <a:spLocks noChangeArrowheads="1"/>
+          </p:cNvSpPr>
           <p:nvPr/>
-        </p:nvPicPr>
-        <p:blipFill>
-          <a:blip r:embed="rId16">
-            <a:extLst>
-              <a:ext uri="{28A0092B-C50C-407E-A947-70E740481C1C}">
-                <a14:useLocalDpi xmlns:a14="http://schemas.microsoft.com/office/drawing/2010/main" val="0"/>
-              </a:ext>
-            </a:extLst>
-          </a:blip>
-          <a:stretch>
-            <a:fillRect/>
-          </a:stretch>
-        </p:blipFill>
-        <p:spPr>
+        </p:nvSpPr>
+        <p:spPr bwMode="auto">
           <a:xfrm>
-            <a:off x="24883258" y="11998029"/>
-            <a:ext cx="12801600" cy="2695074"/>
+            <a:off x="10801498" y="10660090"/>
+            <a:ext cx="26883360" cy="844173"/>
           </a:xfrm>
           <a:prstGeom prst="rect">
             <a:avLst/>
           </a:prstGeom>
+          <a:solidFill>
+            <a:srgbClr val="A40A1D"/>
+          </a:solidFill>
+          <a:ln w="25400">
+            <a:noFill/>
+            <a:miter lim="800000"/>
+            <a:headEnd/>
+            <a:tailEnd/>
+          </a:ln>
+          <a:effectLst/>
         </p:spPr>
-      </p:pic>
+        <p:txBody>
+          <a:bodyPr wrap="square" lIns="79230" tIns="39614" rIns="79230" bIns="39614">
+            <a:prstTxWarp prst="textNoShape">
+              <a:avLst/>
+            </a:prstTxWarp>
+            <a:spAutoFit/>
+          </a:bodyPr>
+          <a:lstStyle/>
+          <a:p>
+            <a:pPr algn="ctr">
+              <a:spcBef>
+                <a:spcPct val="50000"/>
+              </a:spcBef>
+            </a:pPr>
+            <a:r>
+              <a:rPr lang="en-US" sz="5000" b="1" dirty="0">
+                <a:solidFill>
+                  <a:schemeClr val="bg1"/>
+                </a:solidFill>
+                <a:latin typeface="Arial"/>
+                <a:cs typeface="Arial"/>
+              </a:rPr>
+              <a:t>DDM </a:t>
+            </a:r>
+            <a:r>
+              <a:rPr lang="en-US" sz="5000" b="1" dirty="0" err="1">
+                <a:solidFill>
+                  <a:schemeClr val="bg1"/>
+                </a:solidFill>
+                <a:latin typeface="Arial"/>
+                <a:cs typeface="Arial"/>
+              </a:rPr>
+              <a:t>vs</a:t>
+            </a:r>
+            <a:r>
+              <a:rPr lang="en-US" sz="5000" b="1" dirty="0">
+                <a:solidFill>
+                  <a:schemeClr val="bg1"/>
+                </a:solidFill>
+                <a:latin typeface="Arial"/>
+                <a:cs typeface="Arial"/>
+              </a:rPr>
+              <a:t> Raw measure reliability</a:t>
+            </a:r>
+            <a:endParaRPr lang="en-US" sz="5000" dirty="0">
+              <a:solidFill>
+                <a:schemeClr val="bg1"/>
+              </a:solidFill>
+              <a:latin typeface="Arial"/>
+              <a:cs typeface="Arial"/>
+            </a:endParaRPr>
+          </a:p>
+        </p:txBody>
+      </p:sp>
+      <p:sp>
+        <p:nvSpPr>
+          <p:cNvPr id="62" name="Rectangle 61"/>
+          <p:cNvSpPr/>
+          <p:nvPr/>
+        </p:nvSpPr>
+        <p:spPr>
+          <a:xfrm>
+            <a:off x="30593598" y="12017441"/>
+            <a:ext cx="6111719" cy="4437029"/>
+          </a:xfrm>
+          <a:prstGeom prst="rect">
+            <a:avLst/>
+          </a:prstGeom>
+          <a:noFill/>
+        </p:spPr>
+        <p:txBody>
+          <a:bodyPr wrap="square" lIns="274320" rIns="274320" rtlCol="0">
+            <a:noAutofit/>
+          </a:bodyPr>
+          <a:lstStyle/>
+          <a:p>
+            <a:pPr>
+              <a:buFont typeface="Arial"/>
+              <a:buChar char="•"/>
+            </a:pPr>
+            <a:r>
+              <a:rPr lang="en-US" sz="4400" dirty="0" smtClean="0">
+                <a:latin typeface="Arial"/>
+                <a:cs typeface="Arial"/>
+              </a:rPr>
+              <a:t> </a:t>
+            </a:r>
+            <a:r>
+              <a:rPr lang="en-US" sz="4400" dirty="0" smtClean="0">
+                <a:latin typeface="Arial"/>
+                <a:cs typeface="Arial"/>
+              </a:rPr>
+              <a:t>Stats for figure </a:t>
+            </a:r>
+            <a:r>
+              <a:rPr lang="en-US" sz="4400" dirty="0" smtClean="0">
+                <a:latin typeface="Arial"/>
+                <a:cs typeface="Arial"/>
+                <a:sym typeface="Wingdings"/>
+              </a:rPr>
+              <a:t></a:t>
+            </a:r>
+          </a:p>
+          <a:p>
+            <a:pPr>
+              <a:buFont typeface="Arial"/>
+              <a:buChar char="•"/>
+            </a:pPr>
+            <a:r>
+              <a:rPr lang="en-US" sz="4400" dirty="0">
+                <a:latin typeface="Arial"/>
+                <a:cs typeface="Arial"/>
+                <a:sym typeface="Wingdings"/>
+              </a:rPr>
+              <a:t> </a:t>
+            </a:r>
+            <a:r>
+              <a:rPr lang="en-US" sz="4400" dirty="0" smtClean="0">
+                <a:latin typeface="Arial"/>
+                <a:cs typeface="Arial"/>
+                <a:sym typeface="Wingdings"/>
+              </a:rPr>
+              <a:t>Stats for variance differences</a:t>
+            </a:r>
+            <a:endParaRPr lang="en-US" sz="4400" dirty="0">
+              <a:latin typeface="Arial"/>
+              <a:cs typeface="Arial"/>
+            </a:endParaRPr>
+          </a:p>
+        </p:txBody>
+      </p:sp>
     </p:spTree>
   </p:cSld>
   <p:clrMapOvr>

</xml_diff>

<commit_message>
playing around with k means
</commit_message>
<xml_diff>
--- a/presentations/NeuroeconPoster2018.pptx
+++ b/presentations/NeuroeconPoster2018.pptx
@@ -112,7 +112,7 @@
   </p:defaultTextStyle>
   <p:extLst>
     <p:ext uri="{EFAFB233-063F-42B5-8137-9DF3F51BA10A}">
-      <p15:sldGuideLst xmlns:p15="http://schemas.microsoft.com/office/powerpoint/2012/main" xmlns="">
+      <p15:sldGuideLst xmlns="" xmlns:p15="http://schemas.microsoft.com/office/powerpoint/2012/main">
         <p15:guide id="1" orient="horz" pos="10368">
           <p15:clr>
             <a:srgbClr val="A4A3A4"/>
@@ -217,7 +217,7 @@
           <a:p>
             <a:fld id="{1ADD2877-6E47-914A-A562-5BB1D9253FFF}" type="datetimeFigureOut">
               <a:rPr lang="en-US" smtClean="0"/>
-              <a:t>9/24/18</a:t>
+              <a:t>9/26/18</a:t>
             </a:fld>
             <a:endParaRPr lang="en-US"/>
           </a:p>
@@ -383,7 +383,7 @@
             <a:fld id="{9C8C3FF2-16C4-3444-9527-EB6C5966600B}" type="datetimeFigureOut">
               <a:rPr lang="en-US" smtClean="0"/>
               <a:pPr/>
-              <a:t>9/24/18</a:t>
+              <a:t>9/26/18</a:t>
             </a:fld>
             <a:endParaRPr lang="en-US"/>
           </a:p>
@@ -1116,7 +1116,7 @@
             <a:fld id="{34EA0383-EA84-CF41-8911-55C3D60C640A}" type="datetimeFigureOut">
               <a:rPr lang="en-US" smtClean="0"/>
               <a:pPr/>
-              <a:t>9/24/18</a:t>
+              <a:t>9/26/18</a:t>
             </a:fld>
             <a:endParaRPr lang="en-US"/>
           </a:p>
@@ -1283,7 +1283,7 @@
             <a:fld id="{34EA0383-EA84-CF41-8911-55C3D60C640A}" type="datetimeFigureOut">
               <a:rPr lang="en-US" smtClean="0"/>
               <a:pPr/>
-              <a:t>9/24/18</a:t>
+              <a:t>9/26/18</a:t>
             </a:fld>
             <a:endParaRPr lang="en-US"/>
           </a:p>
@@ -1460,7 +1460,7 @@
             <a:fld id="{34EA0383-EA84-CF41-8911-55C3D60C640A}" type="datetimeFigureOut">
               <a:rPr lang="en-US" smtClean="0"/>
               <a:pPr/>
-              <a:t>9/24/18</a:t>
+              <a:t>9/26/18</a:t>
             </a:fld>
             <a:endParaRPr lang="en-US"/>
           </a:p>
@@ -1627,7 +1627,7 @@
             <a:fld id="{34EA0383-EA84-CF41-8911-55C3D60C640A}" type="datetimeFigureOut">
               <a:rPr lang="en-US" smtClean="0"/>
               <a:pPr/>
-              <a:t>9/24/18</a:t>
+              <a:t>9/26/18</a:t>
             </a:fld>
             <a:endParaRPr lang="en-US"/>
           </a:p>
@@ -1870,7 +1870,7 @@
             <a:fld id="{34EA0383-EA84-CF41-8911-55C3D60C640A}" type="datetimeFigureOut">
               <a:rPr lang="en-US" smtClean="0"/>
               <a:pPr/>
-              <a:t>9/24/18</a:t>
+              <a:t>9/26/18</a:t>
             </a:fld>
             <a:endParaRPr lang="en-US"/>
           </a:p>
@@ -2155,7 +2155,7 @@
             <a:fld id="{34EA0383-EA84-CF41-8911-55C3D60C640A}" type="datetimeFigureOut">
               <a:rPr lang="en-US" smtClean="0"/>
               <a:pPr/>
-              <a:t>9/24/18</a:t>
+              <a:t>9/26/18</a:t>
             </a:fld>
             <a:endParaRPr lang="en-US"/>
           </a:p>
@@ -2579,7 +2579,7 @@
             <a:fld id="{34EA0383-EA84-CF41-8911-55C3D60C640A}" type="datetimeFigureOut">
               <a:rPr lang="en-US" smtClean="0"/>
               <a:pPr/>
-              <a:t>9/24/18</a:t>
+              <a:t>9/26/18</a:t>
             </a:fld>
             <a:endParaRPr lang="en-US"/>
           </a:p>
@@ -2694,7 +2694,7 @@
             <a:fld id="{34EA0383-EA84-CF41-8911-55C3D60C640A}" type="datetimeFigureOut">
               <a:rPr lang="en-US" smtClean="0"/>
               <a:pPr/>
-              <a:t>9/24/18</a:t>
+              <a:t>9/26/18</a:t>
             </a:fld>
             <a:endParaRPr lang="en-US"/>
           </a:p>
@@ -2786,7 +2786,7 @@
             <a:fld id="{34EA0383-EA84-CF41-8911-55C3D60C640A}" type="datetimeFigureOut">
               <a:rPr lang="en-US" smtClean="0"/>
               <a:pPr/>
-              <a:t>9/24/18</a:t>
+              <a:t>9/26/18</a:t>
             </a:fld>
             <a:endParaRPr lang="en-US"/>
           </a:p>
@@ -3060,7 +3060,7 @@
             <a:fld id="{34EA0383-EA84-CF41-8911-55C3D60C640A}" type="datetimeFigureOut">
               <a:rPr lang="en-US" smtClean="0"/>
               <a:pPr/>
-              <a:t>9/24/18</a:t>
+              <a:t>9/26/18</a:t>
             </a:fld>
             <a:endParaRPr lang="en-US"/>
           </a:p>
@@ -3310,7 +3310,7 @@
             <a:fld id="{34EA0383-EA84-CF41-8911-55C3D60C640A}" type="datetimeFigureOut">
               <a:rPr lang="en-US" smtClean="0"/>
               <a:pPr/>
-              <a:t>9/24/18</a:t>
+              <a:t>9/26/18</a:t>
             </a:fld>
             <a:endParaRPr lang="en-US"/>
           </a:p>
@@ -3520,7 +3520,7 @@
             <a:fld id="{34EA0383-EA84-CF41-8911-55C3D60C640A}" type="datetimeFigureOut">
               <a:rPr lang="en-US" smtClean="0"/>
               <a:pPr/>
-              <a:t>9/24/18</a:t>
+              <a:t>9/26/18</a:t>
             </a:fld>
             <a:endParaRPr lang="en-US"/>
           </a:p>
@@ -4732,35 +4732,7 @@
                 <a:latin typeface="Arial"/>
                 <a:cs typeface="Arial"/>
               </a:rPr>
-              <a:t> Drift diffusion parameters </a:t>
-            </a:r>
-            <a:r>
-              <a:rPr lang="en-US" sz="4400" dirty="0" smtClean="0">
-                <a:latin typeface="Arial"/>
-                <a:cs typeface="Arial"/>
-              </a:rPr>
-              <a:t>show</a:t>
-            </a:r>
-            <a:r>
-              <a:rPr lang="en-US" sz="4400" dirty="0" smtClean="0">
-                <a:latin typeface="Arial"/>
-                <a:cs typeface="Arial"/>
-              </a:rPr>
-              <a:t> </a:t>
-            </a:r>
-            <a:r>
-              <a:rPr lang="en-US" sz="4400" dirty="0" smtClean="0">
-                <a:latin typeface="Arial"/>
-                <a:cs typeface="Arial"/>
-              </a:rPr>
-              <a:t>similar reliability to RT and </a:t>
-            </a:r>
-            <a:r>
-              <a:rPr lang="en-US" sz="4400" dirty="0" smtClean="0">
-                <a:latin typeface="Arial"/>
-                <a:cs typeface="Arial"/>
-              </a:rPr>
-              <a:t>accuracy</a:t>
+              <a:t> Drift diffusion parameters show similar reliability to RT and accuracy</a:t>
             </a:r>
           </a:p>
           <a:p>
@@ -4800,14 +4772,7 @@
                 <a:latin typeface="Arial"/>
                 <a:cs typeface="Arial"/>
               </a:rPr>
-              <a:t>Hierarchical estimates don’t </a:t>
-            </a:r>
-            <a:r>
-              <a:rPr lang="en-US" sz="4400" dirty="0" smtClean="0">
-                <a:latin typeface="Arial"/>
-                <a:cs typeface="Arial"/>
-              </a:rPr>
-              <a:t>change parameter values or reliability</a:t>
+              <a:t>Hierarchical estimates don’t change parameter values or reliability</a:t>
             </a:r>
             <a:endParaRPr lang="en-US" sz="4400" dirty="0">
               <a:latin typeface="Arial"/>
@@ -5624,17 +5589,7 @@
                 <a:latin typeface="Arial"/>
                 <a:cs typeface="Arial"/>
               </a:rPr>
-              <a:t>Sample size </a:t>
-            </a:r>
-            <a:r>
-              <a:rPr lang="en-US" sz="5000" b="1" dirty="0" smtClean="0">
-                <a:solidFill>
-                  <a:schemeClr val="bg1"/>
-                </a:solidFill>
-                <a:latin typeface="Arial"/>
-                <a:cs typeface="Arial"/>
-              </a:rPr>
-              <a:t>effects on reliability</a:t>
+              <a:t>Sample size effects on reliability</a:t>
             </a:r>
             <a:endParaRPr lang="en-US" sz="5000" dirty="0">
               <a:solidFill>
@@ -6178,33 +6133,8 @@
                 <a:latin typeface="Arial"/>
                 <a:cs typeface="Arial"/>
               </a:rPr>
-              <a:t> </a:t>
-            </a:r>
-            <a:r>
-              <a:rPr lang="en-US" sz="4400" dirty="0" smtClean="0">
-                <a:latin typeface="Arial"/>
-                <a:cs typeface="Arial"/>
-              </a:rPr>
-              <a:t>Measurements</a:t>
-            </a:r>
-            <a:r>
-              <a:rPr lang="en-US" sz="4400" dirty="0" smtClean="0">
-                <a:latin typeface="Arial"/>
-                <a:cs typeface="Arial"/>
-              </a:rPr>
-              <a:t> from s</a:t>
-            </a:r>
-            <a:r>
-              <a:rPr lang="en-US" sz="4400" dirty="0" smtClean="0">
-                <a:latin typeface="Arial"/>
-                <a:cs typeface="Arial"/>
-              </a:rPr>
-              <a:t>amples &lt;15 are significantly less reliable (b=0.001, t(505)=4.92)</a:t>
-            </a:r>
-            <a:endParaRPr lang="en-US" sz="4400" dirty="0" smtClean="0">
-              <a:latin typeface="Arial"/>
-              <a:cs typeface="Arial"/>
-            </a:endParaRPr>
+              <a:t> Measurements from samples &lt;15 are significantly less reliable (b=0.001, t(505)=4.92)</a:t>
+            </a:r>
           </a:p>
           <a:p>
             <a:pPr>
@@ -6329,6 +6259,48 @@
               <a:latin typeface="Arial"/>
               <a:cs typeface="Arial"/>
             </a:endParaRPr>
+          </a:p>
+        </p:txBody>
+      </p:sp>
+      <p:sp>
+        <p:nvSpPr>
+          <p:cNvPr id="3" name="TextBox 2"/>
+          <p:cNvSpPr txBox="1"/>
+          <p:nvPr/>
+        </p:nvSpPr>
+        <p:spPr>
+          <a:xfrm>
+            <a:off x="38992223" y="18537630"/>
+            <a:ext cx="20340800" cy="1338828"/>
+          </a:xfrm>
+          <a:prstGeom prst="rect">
+            <a:avLst/>
+          </a:prstGeom>
+          <a:noFill/>
+        </p:spPr>
+        <p:txBody>
+          <a:bodyPr wrap="none" rtlCol="0">
+            <a:spAutoFit/>
+          </a:bodyPr>
+          <a:lstStyle/>
+          <a:p>
+            <a:r>
+              <a:rPr lang="en-US" dirty="0" smtClean="0"/>
+              <a:t>Variances of reliability estimates in flat </a:t>
+            </a:r>
+            <a:r>
+              <a:rPr lang="en-US" dirty="0" err="1" smtClean="0"/>
+              <a:t>vs</a:t>
+            </a:r>
+            <a:r>
+              <a:rPr lang="en-US" dirty="0" smtClean="0"/>
+              <a:t> </a:t>
+            </a:r>
+            <a:r>
+              <a:rPr lang="en-US" dirty="0" err="1" smtClean="0"/>
+              <a:t>hddm</a:t>
+            </a:r>
+            <a:endParaRPr lang="en-US" dirty="0"/>
           </a:p>
         </p:txBody>
       </p:sp>

</xml_diff>

<commit_message>
cleaning up factor analysis notes
</commit_message>
<xml_diff>
--- a/presentations/NeuroeconPoster2018.pptx
+++ b/presentations/NeuroeconPoster2018.pptx
@@ -112,7 +112,7 @@
   </p:defaultTextStyle>
   <p:extLst>
     <p:ext uri="{EFAFB233-063F-42B5-8137-9DF3F51BA10A}">
-      <p15:sldGuideLst xmlns="" xmlns:p15="http://schemas.microsoft.com/office/powerpoint/2012/main">
+      <p15:sldGuideLst xmlns:p15="http://schemas.microsoft.com/office/powerpoint/2012/main" xmlns="">
         <p15:guide id="1" orient="horz" pos="10368">
           <p15:clr>
             <a:srgbClr val="A4A3A4"/>
@@ -217,7 +217,7 @@
           <a:p>
             <a:fld id="{1ADD2877-6E47-914A-A562-5BB1D9253FFF}" type="datetimeFigureOut">
               <a:rPr lang="en-US" smtClean="0"/>
-              <a:t>9/26/18</a:t>
+              <a:t>9/27/18</a:t>
             </a:fld>
             <a:endParaRPr lang="en-US"/>
           </a:p>
@@ -383,7 +383,7 @@
             <a:fld id="{9C8C3FF2-16C4-3444-9527-EB6C5966600B}" type="datetimeFigureOut">
               <a:rPr lang="en-US" smtClean="0"/>
               <a:pPr/>
-              <a:t>9/26/18</a:t>
+              <a:t>9/27/18</a:t>
             </a:fld>
             <a:endParaRPr lang="en-US"/>
           </a:p>
@@ -1116,7 +1116,7 @@
             <a:fld id="{34EA0383-EA84-CF41-8911-55C3D60C640A}" type="datetimeFigureOut">
               <a:rPr lang="en-US" smtClean="0"/>
               <a:pPr/>
-              <a:t>9/26/18</a:t>
+              <a:t>9/27/18</a:t>
             </a:fld>
             <a:endParaRPr lang="en-US"/>
           </a:p>
@@ -1283,7 +1283,7 @@
             <a:fld id="{34EA0383-EA84-CF41-8911-55C3D60C640A}" type="datetimeFigureOut">
               <a:rPr lang="en-US" smtClean="0"/>
               <a:pPr/>
-              <a:t>9/26/18</a:t>
+              <a:t>9/27/18</a:t>
             </a:fld>
             <a:endParaRPr lang="en-US"/>
           </a:p>
@@ -1460,7 +1460,7 @@
             <a:fld id="{34EA0383-EA84-CF41-8911-55C3D60C640A}" type="datetimeFigureOut">
               <a:rPr lang="en-US" smtClean="0"/>
               <a:pPr/>
-              <a:t>9/26/18</a:t>
+              <a:t>9/27/18</a:t>
             </a:fld>
             <a:endParaRPr lang="en-US"/>
           </a:p>
@@ -1627,7 +1627,7 @@
             <a:fld id="{34EA0383-EA84-CF41-8911-55C3D60C640A}" type="datetimeFigureOut">
               <a:rPr lang="en-US" smtClean="0"/>
               <a:pPr/>
-              <a:t>9/26/18</a:t>
+              <a:t>9/27/18</a:t>
             </a:fld>
             <a:endParaRPr lang="en-US"/>
           </a:p>
@@ -1870,7 +1870,7 @@
             <a:fld id="{34EA0383-EA84-CF41-8911-55C3D60C640A}" type="datetimeFigureOut">
               <a:rPr lang="en-US" smtClean="0"/>
               <a:pPr/>
-              <a:t>9/26/18</a:t>
+              <a:t>9/27/18</a:t>
             </a:fld>
             <a:endParaRPr lang="en-US"/>
           </a:p>
@@ -2155,7 +2155,7 @@
             <a:fld id="{34EA0383-EA84-CF41-8911-55C3D60C640A}" type="datetimeFigureOut">
               <a:rPr lang="en-US" smtClean="0"/>
               <a:pPr/>
-              <a:t>9/26/18</a:t>
+              <a:t>9/27/18</a:t>
             </a:fld>
             <a:endParaRPr lang="en-US"/>
           </a:p>
@@ -2579,7 +2579,7 @@
             <a:fld id="{34EA0383-EA84-CF41-8911-55C3D60C640A}" type="datetimeFigureOut">
               <a:rPr lang="en-US" smtClean="0"/>
               <a:pPr/>
-              <a:t>9/26/18</a:t>
+              <a:t>9/27/18</a:t>
             </a:fld>
             <a:endParaRPr lang="en-US"/>
           </a:p>
@@ -2694,7 +2694,7 @@
             <a:fld id="{34EA0383-EA84-CF41-8911-55C3D60C640A}" type="datetimeFigureOut">
               <a:rPr lang="en-US" smtClean="0"/>
               <a:pPr/>
-              <a:t>9/26/18</a:t>
+              <a:t>9/27/18</a:t>
             </a:fld>
             <a:endParaRPr lang="en-US"/>
           </a:p>
@@ -2786,7 +2786,7 @@
             <a:fld id="{34EA0383-EA84-CF41-8911-55C3D60C640A}" type="datetimeFigureOut">
               <a:rPr lang="en-US" smtClean="0"/>
               <a:pPr/>
-              <a:t>9/26/18</a:t>
+              <a:t>9/27/18</a:t>
             </a:fld>
             <a:endParaRPr lang="en-US"/>
           </a:p>
@@ -3060,7 +3060,7 @@
             <a:fld id="{34EA0383-EA84-CF41-8911-55C3D60C640A}" type="datetimeFigureOut">
               <a:rPr lang="en-US" smtClean="0"/>
               <a:pPr/>
-              <a:t>9/26/18</a:t>
+              <a:t>9/27/18</a:t>
             </a:fld>
             <a:endParaRPr lang="en-US"/>
           </a:p>
@@ -3310,7 +3310,7 @@
             <a:fld id="{34EA0383-EA84-CF41-8911-55C3D60C640A}" type="datetimeFigureOut">
               <a:rPr lang="en-US" smtClean="0"/>
               <a:pPr/>
-              <a:t>9/26/18</a:t>
+              <a:t>9/27/18</a:t>
             </a:fld>
             <a:endParaRPr lang="en-US"/>
           </a:p>
@@ -3520,7 +3520,7 @@
             <a:fld id="{34EA0383-EA84-CF41-8911-55C3D60C640A}" type="datetimeFigureOut">
               <a:rPr lang="en-US" smtClean="0"/>
               <a:pPr/>
-              <a:t>9/26/18</a:t>
+              <a:t>9/27/18</a:t>
             </a:fld>
             <a:endParaRPr lang="en-US"/>
           </a:p>
@@ -4732,7 +4732,21 @@
                 <a:latin typeface="Arial"/>
                 <a:cs typeface="Arial"/>
               </a:rPr>
-              <a:t> Drift diffusion parameters show similar reliability to RT and accuracy</a:t>
+              <a:t> </a:t>
+            </a:r>
+            <a:r>
+              <a:rPr lang="en-US" sz="4400" dirty="0" smtClean="0">
+                <a:latin typeface="Arial"/>
+                <a:cs typeface="Arial"/>
+              </a:rPr>
+              <a:t>DDM </a:t>
+            </a:r>
+            <a:r>
+              <a:rPr lang="en-US" sz="4400" dirty="0" smtClean="0">
+                <a:latin typeface="Arial"/>
+                <a:cs typeface="Arial"/>
+              </a:rPr>
+              <a:t>parameters show similar reliability to RT and accuracy</a:t>
             </a:r>
           </a:p>
           <a:p>
@@ -4752,8 +4766,12 @@
                 <a:latin typeface="Arial"/>
                 <a:cs typeface="Arial"/>
               </a:rPr>
-              <a:t>Sample sizes &lt;15 are less reliable</a:t>
-            </a:r>
+              <a:t>Pilot studies of variable selection need n&gt;15 for reliable decisions </a:t>
+            </a:r>
+            <a:endParaRPr lang="en-US" sz="4400" dirty="0" smtClean="0">
+              <a:latin typeface="Arial"/>
+              <a:cs typeface="Arial"/>
+            </a:endParaRPr>
           </a:p>
           <a:p>
             <a:pPr>
@@ -4772,7 +4790,42 @@
                 <a:latin typeface="Arial"/>
                 <a:cs typeface="Arial"/>
               </a:rPr>
-              <a:t>Hierarchical estimates don’t change parameter values or reliability</a:t>
+              <a:t>Hierarchical </a:t>
+            </a:r>
+            <a:r>
+              <a:rPr lang="en-US" sz="4400" dirty="0" smtClean="0">
+                <a:latin typeface="Arial"/>
+                <a:cs typeface="Arial"/>
+              </a:rPr>
+              <a:t>estimates </a:t>
+            </a:r>
+            <a:r>
+              <a:rPr lang="en-US" sz="4400" dirty="0" smtClean="0">
+                <a:latin typeface="Arial"/>
+                <a:cs typeface="Arial"/>
+              </a:rPr>
+              <a:t>do not </a:t>
+            </a:r>
+            <a:r>
+              <a:rPr lang="en-US" sz="4400" dirty="0" smtClean="0">
+                <a:latin typeface="Arial"/>
+                <a:cs typeface="Arial"/>
+              </a:rPr>
+              <a:t>change parameter </a:t>
+            </a:r>
+            <a:r>
+              <a:rPr lang="en-US" sz="4400" dirty="0" smtClean="0">
+                <a:latin typeface="Arial"/>
+                <a:cs typeface="Arial"/>
+              </a:rPr>
+              <a:t>value </a:t>
+            </a:r>
+            <a:r>
+              <a:rPr lang="en-US" sz="4400" dirty="0" smtClean="0">
+                <a:latin typeface="Arial"/>
+                <a:cs typeface="Arial"/>
+              </a:rPr>
+              <a:t>or reliability</a:t>
             </a:r>
             <a:endParaRPr lang="en-US" sz="4400" dirty="0">
               <a:latin typeface="Arial"/>
@@ -6129,11 +6182,25 @@
               <a:buChar char="•"/>
             </a:pPr>
             <a:r>
+              <a:rPr lang="en-US" sz="4400" dirty="0">
+                <a:latin typeface="Arial"/>
+                <a:cs typeface="Arial"/>
+              </a:rPr>
+              <a:t> </a:t>
+            </a:r>
+            <a:r>
               <a:rPr lang="en-US" sz="4400" dirty="0" smtClean="0">
                 <a:latin typeface="Arial"/>
                 <a:cs typeface="Arial"/>
               </a:rPr>
-              <a:t> Measurements from samples &lt;15 are significantly less reliable (b=0.001, t(505)=4.92)</a:t>
+              <a:t>Measurements </a:t>
+            </a:r>
+            <a:r>
+              <a:rPr lang="en-US" sz="4400" dirty="0" smtClean="0">
+                <a:latin typeface="Arial"/>
+                <a:cs typeface="Arial"/>
+              </a:rPr>
+              <a:t>from samples &lt;15 are significantly less reliable (b=0.001, t(505)=4.92)</a:t>
             </a:r>
           </a:p>
           <a:p>
@@ -6270,8 +6337,8 @@
         </p:nvSpPr>
         <p:spPr>
           <a:xfrm>
-            <a:off x="38992223" y="18537630"/>
-            <a:ext cx="20340800" cy="1338828"/>
+            <a:off x="38960789" y="17373600"/>
+            <a:ext cx="12033926" cy="2585323"/>
           </a:xfrm>
           <a:prstGeom prst="rect">
             <a:avLst/>
@@ -6279,7 +6346,7 @@
           <a:noFill/>
         </p:spPr>
         <p:txBody>
-          <a:bodyPr wrap="none" rtlCol="0">
+          <a:bodyPr wrap="square" rtlCol="0">
             <a:spAutoFit/>
           </a:bodyPr>
           <a:lstStyle/>
@@ -6301,6 +6368,171 @@
               <a:t>hddm</a:t>
             </a:r>
             <a:endParaRPr lang="en-US" dirty="0"/>
+          </a:p>
+        </p:txBody>
+      </p:sp>
+      <p:sp>
+        <p:nvSpPr>
+          <p:cNvPr id="64" name="Rectangle 63"/>
+          <p:cNvSpPr/>
+          <p:nvPr/>
+        </p:nvSpPr>
+        <p:spPr>
+          <a:xfrm>
+            <a:off x="259768" y="31573821"/>
+            <a:ext cx="10398098" cy="1244845"/>
+          </a:xfrm>
+          <a:prstGeom prst="rect">
+            <a:avLst/>
+          </a:prstGeom>
+          <a:noFill/>
+        </p:spPr>
+        <p:txBody>
+          <a:bodyPr wrap="square" lIns="274320" rIns="274320" rtlCol="0">
+            <a:noAutofit/>
+          </a:bodyPr>
+          <a:lstStyle/>
+          <a:p>
+            <a:r>
+              <a:rPr lang="en-US" sz="1800" dirty="0">
+                <a:latin typeface="Arial"/>
+                <a:cs typeface="Arial"/>
+              </a:rPr>
+              <a:t>Eisenberg, I., </a:t>
+            </a:r>
+            <a:r>
+              <a:rPr lang="en-US" sz="1800" dirty="0" err="1">
+                <a:latin typeface="Arial"/>
+                <a:cs typeface="Arial"/>
+              </a:rPr>
+              <a:t>Bissett</a:t>
+            </a:r>
+            <a:r>
+              <a:rPr lang="en-US" sz="1800" dirty="0">
+                <a:latin typeface="Arial"/>
+                <a:cs typeface="Arial"/>
+              </a:rPr>
+              <a:t>, P., Enkavi, A. Z., Li, J., MacKinnon, D., </a:t>
+            </a:r>
+            <a:r>
+              <a:rPr lang="en-US" sz="1800" dirty="0" err="1">
+                <a:latin typeface="Arial"/>
+                <a:cs typeface="Arial"/>
+              </a:rPr>
+              <a:t>Marsch</a:t>
+            </a:r>
+            <a:r>
+              <a:rPr lang="en-US" sz="1800" dirty="0">
+                <a:latin typeface="Arial"/>
+                <a:cs typeface="Arial"/>
+              </a:rPr>
+              <a:t>, L., &amp; </a:t>
+            </a:r>
+            <a:r>
+              <a:rPr lang="en-US" sz="1800" dirty="0" err="1">
+                <a:latin typeface="Arial"/>
+                <a:cs typeface="Arial"/>
+              </a:rPr>
+              <a:t>Poldrack</a:t>
+            </a:r>
+            <a:r>
+              <a:rPr lang="en-US" sz="1800" dirty="0">
+                <a:latin typeface="Arial"/>
+                <a:cs typeface="Arial"/>
+              </a:rPr>
+              <a:t>, R. (2018). Uncovering mental structure through data-driven ontology </a:t>
+            </a:r>
+            <a:r>
+              <a:rPr lang="en-US" sz="1800" dirty="0" smtClean="0">
+                <a:latin typeface="Arial"/>
+                <a:cs typeface="Arial"/>
+              </a:rPr>
+              <a:t>discovery</a:t>
+            </a:r>
+          </a:p>
+          <a:p>
+            <a:r>
+              <a:rPr lang="en-US" sz="1800" dirty="0">
+                <a:latin typeface="Arial"/>
+                <a:cs typeface="Arial"/>
+              </a:rPr>
+              <a:t>Enkavi, A. Z., Eisenberg, I., </a:t>
+            </a:r>
+            <a:r>
+              <a:rPr lang="en-US" sz="1800" dirty="0" err="1">
+                <a:latin typeface="Arial"/>
+                <a:cs typeface="Arial"/>
+              </a:rPr>
+              <a:t>Bissett</a:t>
+            </a:r>
+            <a:r>
+              <a:rPr lang="en-US" sz="1800" dirty="0">
+                <a:latin typeface="Arial"/>
+                <a:cs typeface="Arial"/>
+              </a:rPr>
+              <a:t>, P., </a:t>
+            </a:r>
+            <a:r>
+              <a:rPr lang="en-US" sz="1800" dirty="0" err="1">
+                <a:latin typeface="Arial"/>
+                <a:cs typeface="Arial"/>
+              </a:rPr>
+              <a:t>Mazza</a:t>
+            </a:r>
+            <a:r>
+              <a:rPr lang="en-US" sz="1800" dirty="0">
+                <a:latin typeface="Arial"/>
+                <a:cs typeface="Arial"/>
+              </a:rPr>
+              <a:t>, G. L., MacKinnon, D. P., </a:t>
+            </a:r>
+            <a:r>
+              <a:rPr lang="en-US" sz="1800" dirty="0" err="1">
+                <a:latin typeface="Arial"/>
+                <a:cs typeface="Arial"/>
+              </a:rPr>
+              <a:t>Marsch</a:t>
+            </a:r>
+            <a:r>
+              <a:rPr lang="en-US" sz="1800" dirty="0">
+                <a:latin typeface="Arial"/>
+                <a:cs typeface="Arial"/>
+              </a:rPr>
+              <a:t>, L. A., &amp; </a:t>
+            </a:r>
+            <a:r>
+              <a:rPr lang="en-US" sz="1800" dirty="0" err="1">
+                <a:latin typeface="Arial"/>
+                <a:cs typeface="Arial"/>
+              </a:rPr>
+              <a:t>Poldrack</a:t>
+            </a:r>
+            <a:r>
+              <a:rPr lang="en-US" sz="1800" dirty="0">
+                <a:latin typeface="Arial"/>
+                <a:cs typeface="Arial"/>
+              </a:rPr>
+              <a:t>, R. (2018). A large-scale analysis of test-retest reliabilities of self-regulation measures</a:t>
+            </a:r>
+            <a:r>
+              <a:rPr lang="en-US" sz="1800" dirty="0" smtClean="0">
+                <a:latin typeface="Arial"/>
+                <a:cs typeface="Arial"/>
+              </a:rPr>
+              <a:t>.</a:t>
+            </a:r>
+          </a:p>
+          <a:p>
+            <a:endParaRPr lang="en-US" sz="1800" dirty="0" smtClean="0">
+              <a:latin typeface="Arial"/>
+              <a:cs typeface="Arial"/>
+            </a:endParaRPr>
+          </a:p>
+          <a:p>
+            <a:endParaRPr lang="en-US" sz="1800" dirty="0">
+              <a:latin typeface="Arial"/>
+              <a:cs typeface="Arial"/>
+            </a:endParaRPr>
           </a:p>
         </p:txBody>
       </p:sp>

</xml_diff>

<commit_message>
scrambling first draft for poster
</commit_message>
<xml_diff>
--- a/presentations/NeuroeconPoster2018.pptx
+++ b/presentations/NeuroeconPoster2018.pptx
@@ -5961,6 +5961,9 @@
             </a:pPr>
             <a:r>
               <a:rPr lang="en-US" sz="4400" dirty="0" smtClean="0">
+                <a:solidFill>
+                  <a:srgbClr val="FF0000"/>
+                </a:solidFill>
                 <a:latin typeface="Arial"/>
                 <a:cs typeface="Arial"/>
               </a:rPr>
@@ -5968,6 +5971,9 @@
             </a:r>
             <a:r>
               <a:rPr lang="en-US" sz="4400" dirty="0" smtClean="0">
+                <a:solidFill>
+                  <a:srgbClr val="FF0000"/>
+                </a:solidFill>
                 <a:latin typeface="Arial"/>
                 <a:cs typeface="Arial"/>
                 <a:sym typeface="Wingdings"/>
@@ -5982,6 +5988,9 @@
             </a:pPr>
             <a:r>
               <a:rPr lang="en-US" sz="4400" dirty="0">
+                <a:solidFill>
+                  <a:srgbClr val="FF0000"/>
+                </a:solidFill>
                 <a:latin typeface="Arial"/>
                 <a:cs typeface="Arial"/>
                 <a:sym typeface="Wingdings"/>
@@ -5990,6 +5999,9 @@
             </a:r>
             <a:r>
               <a:rPr lang="en-US" sz="4400" dirty="0" smtClean="0">
+                <a:solidFill>
+                  <a:srgbClr val="FF0000"/>
+                </a:solidFill>
                 <a:latin typeface="Arial"/>
                 <a:cs typeface="Arial"/>
                 <a:sym typeface="Wingdings"/>
@@ -5997,6 +6009,9 @@
               <a:t>Stats for variance differences</a:t>
             </a:r>
             <a:endParaRPr lang="en-US" sz="4400" dirty="0">
+              <a:solidFill>
+                <a:srgbClr val="FF0000"/>
+              </a:solidFill>
               <a:latin typeface="Arial"/>
               <a:cs typeface="Arial"/>
             </a:endParaRPr>
@@ -6540,6 +6555,86 @@
               </a:rPr>
               <a:t> that compose them</a:t>
             </a:r>
+          </a:p>
+        </p:txBody>
+      </p:sp>
+      <p:pic>
+        <p:nvPicPr>
+          <p:cNvPr id="26" name="Picture 25" descr="fvsm_pred.jpeg"/>
+          <p:cNvPicPr>
+            <a:picLocks noChangeAspect="1"/>
+          </p:cNvPicPr>
+          <p:nvPr/>
+        </p:nvPicPr>
+        <p:blipFill>
+          <a:blip r:embed="rId21">
+            <a:extLst>
+              <a:ext uri="{28A0092B-C50C-407E-A947-70E740481C1C}">
+                <a14:useLocalDpi xmlns:a14="http://schemas.microsoft.com/office/drawing/2010/main" val="0"/>
+              </a:ext>
+            </a:extLst>
+          </a:blip>
+          <a:stretch>
+            <a:fillRect/>
+          </a:stretch>
+        </p:blipFill>
+        <p:spPr>
+          <a:xfrm>
+            <a:off x="24901443" y="24777745"/>
+            <a:ext cx="12801600" cy="5486400"/>
+          </a:xfrm>
+          <a:prstGeom prst="rect">
+            <a:avLst/>
+          </a:prstGeom>
+        </p:spPr>
+      </p:pic>
+      <p:sp>
+        <p:nvSpPr>
+          <p:cNvPr id="69" name="Rectangle 68"/>
+          <p:cNvSpPr/>
+          <p:nvPr/>
+        </p:nvSpPr>
+        <p:spPr>
+          <a:xfrm>
+            <a:off x="24767163" y="30250600"/>
+            <a:ext cx="12801600" cy="1463625"/>
+          </a:xfrm>
+          <a:prstGeom prst="rect">
+            <a:avLst/>
+          </a:prstGeom>
+          <a:noFill/>
+        </p:spPr>
+        <p:txBody>
+          <a:bodyPr wrap="square" lIns="274320" rIns="274320" rtlCol="0">
+            <a:noAutofit/>
+          </a:bodyPr>
+          <a:lstStyle/>
+          <a:p>
+            <a:pPr>
+              <a:buFont typeface="Arial"/>
+              <a:buChar char="•"/>
+            </a:pPr>
+            <a:r>
+              <a:rPr lang="en-US" sz="4400" dirty="0" smtClean="0">
+                <a:solidFill>
+                  <a:srgbClr val="FF0000"/>
+                </a:solidFill>
+                <a:latin typeface="Arial"/>
+                <a:cs typeface="Arial"/>
+              </a:rPr>
+              <a:t>Stats on figure above</a:t>
+            </a:r>
+            <a:r>
+              <a:rPr lang="en-US" sz="4400" dirty="0" smtClean="0">
+                <a:latin typeface="Arial"/>
+                <a:cs typeface="Arial"/>
+              </a:rPr>
+              <a:t> </a:t>
+            </a:r>
+            <a:endParaRPr lang="en-US" sz="4400" dirty="0">
+              <a:latin typeface="Arial"/>
+              <a:cs typeface="Arial"/>
+            </a:endParaRPr>
           </a:p>
         </p:txBody>
       </p:sp>

</xml_diff>

<commit_message>
first draft of poster done
</commit_message>
<xml_diff>
--- a/presentations/NeuroeconPoster2018.pptx
+++ b/presentations/NeuroeconPoster2018.pptx
@@ -4480,7 +4480,7 @@
         </p:nvSpPr>
         <p:spPr bwMode="auto">
           <a:xfrm>
-            <a:off x="471431" y="30982413"/>
+            <a:off x="471431" y="30740533"/>
             <a:ext cx="9774936" cy="659507"/>
           </a:xfrm>
           <a:prstGeom prst="rect">
@@ -4587,8 +4587,8 @@
         </p:nvSpPr>
         <p:spPr>
           <a:xfrm>
-            <a:off x="454934" y="24521980"/>
-            <a:ext cx="9774936" cy="5438114"/>
+            <a:off x="454934" y="24521979"/>
+            <a:ext cx="9774936" cy="6460433"/>
           </a:xfrm>
           <a:prstGeom prst="rect">
             <a:avLst/>
@@ -4630,8 +4630,12 @@
                 <a:latin typeface="Arial"/>
                 <a:cs typeface="Arial"/>
               </a:rPr>
-              <a:t>Pilot studies of variable selection need n&gt;15 for reliable decisions </a:t>
-            </a:r>
+              <a:t>Reliability estimates stabilize n&gt;15</a:t>
+            </a:r>
+            <a:endParaRPr lang="en-US" sz="4400" dirty="0" smtClean="0">
+              <a:latin typeface="Arial"/>
+              <a:cs typeface="Arial"/>
+            </a:endParaRPr>
           </a:p>
           <a:p>
             <a:pPr>
@@ -4650,7 +4654,34 @@
                 <a:latin typeface="Arial"/>
                 <a:cs typeface="Arial"/>
               </a:rPr>
-              <a:t>Hierarchical estimates do not change parameter value or reliability</a:t>
+              <a:t>Hierarchical estimates do not change parameter value or </a:t>
+            </a:r>
+            <a:r>
+              <a:rPr lang="en-US" sz="4400" dirty="0" smtClean="0">
+                <a:latin typeface="Arial"/>
+                <a:cs typeface="Arial"/>
+              </a:rPr>
+              <a:t>reliability</a:t>
+            </a:r>
+          </a:p>
+          <a:p>
+            <a:pPr>
+              <a:buFont typeface="Arial"/>
+              <a:buChar char="•"/>
+            </a:pPr>
+            <a:r>
+              <a:rPr lang="en-US" sz="4400" dirty="0">
+                <a:latin typeface="Arial"/>
+                <a:cs typeface="Arial"/>
+              </a:rPr>
+              <a:t> </a:t>
+            </a:r>
+            <a:r>
+              <a:rPr lang="en-US" sz="4400" dirty="0" smtClean="0">
+                <a:latin typeface="Arial"/>
+                <a:cs typeface="Arial"/>
+              </a:rPr>
+              <a:t>Applying the same model across tasks yields 1. interpretable measures that 2. reduce to lower and more reliable trait measures</a:t>
             </a:r>
             <a:endParaRPr lang="en-US" sz="4400" dirty="0">
               <a:latin typeface="Arial"/>
@@ -6086,7 +6117,7 @@
         </p:nvSpPr>
         <p:spPr>
           <a:xfrm>
-            <a:off x="259768" y="31573821"/>
+            <a:off x="259768" y="31392411"/>
             <a:ext cx="10398098" cy="1244845"/>
           </a:xfrm>
           <a:prstGeom prst="rect">
@@ -6243,15 +6274,90 @@
           </a:p>
         </p:txBody>
       </p:sp>
+      <p:sp>
+        <p:nvSpPr>
+          <p:cNvPr id="68" name="Rectangle 67"/>
+          <p:cNvSpPr/>
+          <p:nvPr/>
+        </p:nvSpPr>
+        <p:spPr>
+          <a:xfrm>
+            <a:off x="11199588" y="30198848"/>
+            <a:ext cx="10334800" cy="1133093"/>
+          </a:xfrm>
+          <a:prstGeom prst="rect">
+            <a:avLst/>
+          </a:prstGeom>
+          <a:noFill/>
+        </p:spPr>
+        <p:txBody>
+          <a:bodyPr wrap="square" lIns="274320" rIns="274320" rtlCol="0">
+            <a:noAutofit/>
+          </a:bodyPr>
+          <a:lstStyle/>
+          <a:p>
+            <a:pPr>
+              <a:buFont typeface="Arial"/>
+              <a:buChar char="•"/>
+            </a:pPr>
+            <a:r>
+              <a:rPr lang="en-US" sz="4400" dirty="0" smtClean="0">
+                <a:latin typeface="Arial"/>
+                <a:cs typeface="Arial"/>
+              </a:rPr>
+              <a:t> PCs </a:t>
+            </a:r>
+            <a:r>
+              <a:rPr lang="en-US" sz="4400" dirty="0" smtClean="0">
+                <a:latin typeface="Arial"/>
+                <a:cs typeface="Arial"/>
+              </a:rPr>
+              <a:t>are more reliable than </a:t>
+            </a:r>
+            <a:r>
+              <a:rPr lang="en-US" sz="4400" dirty="0" smtClean="0">
+                <a:latin typeface="Arial"/>
+                <a:cs typeface="Arial"/>
+              </a:rPr>
+              <a:t>individual measures</a:t>
+            </a:r>
+            <a:r>
+              <a:rPr lang="en-US" sz="4400" dirty="0" smtClean="0">
+                <a:latin typeface="Arial"/>
+                <a:cs typeface="Arial"/>
+              </a:rPr>
+              <a:t> </a:t>
+            </a:r>
+            <a:r>
+              <a:rPr lang="en-US" sz="4400" dirty="0" smtClean="0">
+                <a:latin typeface="Arial"/>
+                <a:cs typeface="Arial"/>
+              </a:rPr>
+              <a:t>that </a:t>
+            </a:r>
+            <a:r>
+              <a:rPr lang="en-US" sz="4400" dirty="0" smtClean="0">
+                <a:latin typeface="Arial"/>
+                <a:cs typeface="Arial"/>
+              </a:rPr>
+              <a:t>compose them</a:t>
+            </a:r>
+            <a:endParaRPr lang="en-US" sz="4400" dirty="0" smtClean="0">
+              <a:latin typeface="Arial"/>
+              <a:cs typeface="Arial"/>
+            </a:endParaRPr>
+          </a:p>
+        </p:txBody>
+      </p:sp>
       <p:pic>
         <p:nvPicPr>
-          <p:cNvPr id="10" name="Picture 9" descr="EZ_PCA3_HClust_nolables.jpeg"/>
+          <p:cNvPr id="8" name="Picture 7" descr="Boot_ddm_plot.jpeg"/>
           <p:cNvPicPr>
-            <a:picLocks/>
+            <a:picLocks noChangeAspect="1"/>
           </p:cNvPicPr>
           <p:nvPr/>
         </p:nvPicPr>
-        <p:blipFill rotWithShape="1">
+        <p:blipFill>
           <a:blip r:embed="rId17">
             <a:extLst>
               <a:ext uri="{28A0092B-C50C-407E-A947-70E740481C1C}">
@@ -6259,22 +6365,135 @@
               </a:ext>
             </a:extLst>
           </a:blip>
-          <a:srcRect l="18148" t="4087" r="19968" b="6022"/>
-          <a:stretch/>
+          <a:stretch>
+            <a:fillRect/>
+          </a:stretch>
         </p:blipFill>
         <p:spPr>
-          <a:xfrm rot="5400000">
-            <a:off x="22540247" y="13385335"/>
-            <a:ext cx="2286000" cy="25603200"/>
+          <a:xfrm>
+            <a:off x="11124963" y="11504263"/>
+            <a:ext cx="20116800" cy="3831771"/>
           </a:xfrm>
           <a:prstGeom prst="rect">
             <a:avLst/>
           </a:prstGeom>
         </p:spPr>
       </p:pic>
+      <p:sp>
+        <p:nvSpPr>
+          <p:cNvPr id="12" name="Rectangle 11"/>
+          <p:cNvSpPr/>
+          <p:nvPr/>
+        </p:nvSpPr>
+        <p:spPr>
+          <a:xfrm>
+            <a:off x="11091332" y="15130684"/>
+            <a:ext cx="26593525" cy="1446550"/>
+          </a:xfrm>
+          <a:prstGeom prst="rect">
+            <a:avLst/>
+          </a:prstGeom>
+        </p:spPr>
+        <p:txBody>
+          <a:bodyPr wrap="square">
+            <a:spAutoFit/>
+          </a:bodyPr>
+          <a:lstStyle/>
+          <a:p>
+            <a:pPr>
+              <a:buFont typeface="Arial"/>
+              <a:buChar char="•"/>
+            </a:pPr>
+            <a:r>
+              <a:rPr lang="en-US" sz="4400" dirty="0" smtClean="0">
+                <a:solidFill>
+                  <a:srgbClr val="000000"/>
+                </a:solidFill>
+                <a:latin typeface="Arial"/>
+                <a:cs typeface="Arial"/>
+                <a:sym typeface="Wingdings"/>
+              </a:rPr>
+              <a:t> Both contrast (b = -0.37, t(512) = -9.99) </a:t>
+            </a:r>
+            <a:r>
+              <a:rPr lang="en-US" sz="4400" dirty="0">
+                <a:solidFill>
+                  <a:srgbClr val="000000"/>
+                </a:solidFill>
+                <a:latin typeface="Arial"/>
+                <a:cs typeface="Arial"/>
+                <a:sym typeface="Wingdings"/>
+              </a:rPr>
+              <a:t>and </a:t>
+            </a:r>
+            <a:r>
+              <a:rPr lang="en-US" sz="4400" dirty="0" smtClean="0">
+                <a:solidFill>
+                  <a:srgbClr val="000000"/>
+                </a:solidFill>
+                <a:latin typeface="Arial"/>
+                <a:cs typeface="Arial"/>
+                <a:sym typeface="Wingdings"/>
+              </a:rPr>
+              <a:t>condition (b = -0.09, t(512) = -2.84) </a:t>
+            </a:r>
+            <a:r>
+              <a:rPr lang="en-US" sz="4400" dirty="0">
+                <a:solidFill>
+                  <a:srgbClr val="000000"/>
+                </a:solidFill>
+                <a:latin typeface="Arial"/>
+                <a:cs typeface="Arial"/>
+                <a:sym typeface="Wingdings"/>
+              </a:rPr>
+              <a:t>measures are less reliable than </a:t>
+            </a:r>
+            <a:r>
+              <a:rPr lang="en-US" sz="4400" dirty="0" smtClean="0">
+                <a:solidFill>
+                  <a:srgbClr val="000000"/>
+                </a:solidFill>
+                <a:latin typeface="Arial"/>
+                <a:cs typeface="Arial"/>
+                <a:sym typeface="Wingdings"/>
+              </a:rPr>
+              <a:t>measures </a:t>
+            </a:r>
+            <a:r>
+              <a:rPr lang="en-US" sz="4400" dirty="0">
+                <a:solidFill>
+                  <a:srgbClr val="000000"/>
+                </a:solidFill>
+                <a:latin typeface="Arial"/>
+                <a:cs typeface="Arial"/>
+                <a:sym typeface="Wingdings"/>
+              </a:rPr>
+              <a:t>that use </a:t>
+            </a:r>
+            <a:r>
+              <a:rPr lang="en-US" sz="4400" dirty="0" smtClean="0">
+                <a:solidFill>
+                  <a:srgbClr val="000000"/>
+                </a:solidFill>
+                <a:latin typeface="Arial"/>
+                <a:cs typeface="Arial"/>
+                <a:sym typeface="Wingdings"/>
+              </a:rPr>
+              <a:t>all trials </a:t>
+            </a:r>
+            <a:endParaRPr lang="en-US" sz="4400" dirty="0">
+              <a:solidFill>
+                <a:srgbClr val="000000"/>
+              </a:solidFill>
+              <a:latin typeface="Arial"/>
+              <a:cs typeface="Arial"/>
+            </a:endParaRPr>
+          </a:p>
+        </p:txBody>
+      </p:sp>
       <p:pic>
         <p:nvPicPr>
-          <p:cNvPr id="11" name="Picture 10" descr="EZ_clust_rel.jpeg"/>
+          <p:cNvPr id="15" name="Picture 14" descr="Sample_size.jpeg"/>
           <p:cNvPicPr>
             <a:picLocks noChangeAspect="1"/>
           </p:cNvPicPr>
@@ -6294,8 +6513,8 @@
         </p:blipFill>
         <p:spPr>
           <a:xfrm>
-            <a:off x="31649096" y="27329936"/>
-            <a:ext cx="5277419" cy="4523501"/>
+            <a:off x="10928167" y="17662817"/>
+            <a:ext cx="6400800" cy="4572000"/>
           </a:xfrm>
           <a:prstGeom prst="rect">
             <a:avLst/>
@@ -6304,14 +6523,102 @@
       </p:pic>
       <p:sp>
         <p:nvSpPr>
-          <p:cNvPr id="68" name="Rectangle 67"/>
+          <p:cNvPr id="27" name="Rectangle 26"/>
           <p:cNvSpPr/>
           <p:nvPr/>
         </p:nvSpPr>
         <p:spPr>
           <a:xfrm>
-            <a:off x="43940167" y="23635959"/>
-            <a:ext cx="6274132" cy="4151176"/>
+            <a:off x="11149278" y="22167597"/>
+            <a:ext cx="13223565" cy="1446550"/>
+          </a:xfrm>
+          <a:prstGeom prst="rect">
+            <a:avLst/>
+          </a:prstGeom>
+        </p:spPr>
+        <p:txBody>
+          <a:bodyPr wrap="square">
+            <a:spAutoFit/>
+          </a:bodyPr>
+          <a:lstStyle/>
+          <a:p>
+            <a:pPr>
+              <a:buFont typeface="Arial"/>
+              <a:buChar char="•"/>
+            </a:pPr>
+            <a:r>
+              <a:rPr lang="en-US" sz="4400" dirty="0">
+                <a:latin typeface="Arial"/>
+                <a:cs typeface="Arial"/>
+              </a:rPr>
+              <a:t> </a:t>
+            </a:r>
+            <a:r>
+              <a:rPr lang="en-US" sz="4400" dirty="0" smtClean="0">
+                <a:latin typeface="Arial"/>
+                <a:cs typeface="Arial"/>
+              </a:rPr>
+              <a:t>Conclusion does not change depending on </a:t>
+            </a:r>
+            <a:r>
+              <a:rPr lang="en-US" sz="4400" dirty="0">
+                <a:latin typeface="Arial"/>
+                <a:cs typeface="Arial"/>
+              </a:rPr>
+              <a:t>measure type (</a:t>
+            </a:r>
+            <a:r>
+              <a:rPr lang="en-US" sz="4400" dirty="0" smtClean="0">
+                <a:latin typeface="Arial"/>
+                <a:cs typeface="Arial"/>
+              </a:rPr>
+              <a:t>raw</a:t>
+            </a:r>
+            <a:r>
+              <a:rPr lang="en-US" sz="4400" dirty="0">
+                <a:latin typeface="Arial"/>
+                <a:cs typeface="Arial"/>
+              </a:rPr>
+              <a:t> </a:t>
+            </a:r>
+            <a:r>
+              <a:rPr lang="en-US" sz="4400" dirty="0" smtClean="0">
+                <a:latin typeface="Arial"/>
+                <a:cs typeface="Arial"/>
+              </a:rPr>
+              <a:t>vs. </a:t>
+            </a:r>
+            <a:r>
+              <a:rPr lang="en-US" sz="4400" dirty="0" err="1" smtClean="0">
+                <a:latin typeface="Arial"/>
+                <a:cs typeface="Arial"/>
+              </a:rPr>
+              <a:t>ddm</a:t>
+            </a:r>
+            <a:r>
+              <a:rPr lang="en-US" sz="4400" dirty="0" smtClean="0">
+                <a:latin typeface="Arial"/>
+                <a:cs typeface="Arial"/>
+              </a:rPr>
+              <a:t>, all trials vs. contrasts)</a:t>
+            </a:r>
+            <a:endParaRPr lang="en-US" sz="4400" dirty="0">
+              <a:latin typeface="Arial"/>
+              <a:cs typeface="Arial"/>
+            </a:endParaRPr>
+          </a:p>
+        </p:txBody>
+      </p:sp>
+      <p:sp>
+        <p:nvSpPr>
+          <p:cNvPr id="67" name="Rectangle 66"/>
+          <p:cNvSpPr/>
+          <p:nvPr/>
+        </p:nvSpPr>
+        <p:spPr>
+          <a:xfrm>
+            <a:off x="11174328" y="27328876"/>
+            <a:ext cx="6154640" cy="1310814"/>
           </a:xfrm>
           <a:prstGeom prst="rect">
             <a:avLst/>
@@ -6324,352 +6631,30 @@
           </a:bodyPr>
           <a:lstStyle/>
           <a:p>
-            <a:pPr>
-              <a:buFont typeface="Arial"/>
-              <a:buChar char="•"/>
-            </a:pPr>
-            <a:r>
-              <a:rPr lang="en-US" sz="4400" dirty="0">
-                <a:latin typeface="Arial"/>
-                <a:cs typeface="Arial"/>
-              </a:rPr>
-              <a:t> </a:t>
-            </a:r>
-            <a:r>
-              <a:rPr lang="en-US" sz="4400" dirty="0" smtClean="0">
-                <a:latin typeface="Arial"/>
-                <a:cs typeface="Arial"/>
-              </a:rPr>
-              <a:t>3 PCs for EZ </a:t>
-            </a:r>
-            <a:r>
-              <a:rPr lang="en-US" sz="4400" dirty="0" err="1" smtClean="0">
-                <a:latin typeface="Arial"/>
-                <a:cs typeface="Arial"/>
-              </a:rPr>
-              <a:t>ddm</a:t>
-            </a:r>
-            <a:r>
-              <a:rPr lang="en-US" sz="4400" dirty="0" smtClean="0">
-                <a:latin typeface="Arial"/>
-                <a:cs typeface="Arial"/>
-              </a:rPr>
-              <a:t> variables</a:t>
-            </a:r>
-            <a:r>
-              <a:rPr lang="en-US" sz="4400" dirty="0">
-                <a:latin typeface="Arial"/>
-                <a:cs typeface="Arial"/>
-              </a:rPr>
-              <a:t> </a:t>
-            </a:r>
-            <a:r>
-              <a:rPr lang="en-US" sz="4400" dirty="0" smtClean="0">
-                <a:latin typeface="Arial"/>
-                <a:cs typeface="Arial"/>
-              </a:rPr>
-              <a:t>calculated on T1 data and used to predict T2 scores</a:t>
-            </a:r>
-          </a:p>
-          <a:p>
-            <a:pPr>
-              <a:buFont typeface="Arial"/>
-              <a:buChar char="•"/>
-            </a:pPr>
-            <a:r>
-              <a:rPr lang="en-US" sz="4400" dirty="0" smtClean="0">
-                <a:latin typeface="Arial"/>
-                <a:cs typeface="Arial"/>
-              </a:rPr>
-              <a:t> PCs are more reliable than </a:t>
-            </a:r>
-            <a:r>
-              <a:rPr lang="en-US" sz="4400" dirty="0" err="1" smtClean="0">
-                <a:latin typeface="Arial"/>
-                <a:cs typeface="Arial"/>
-              </a:rPr>
-              <a:t>dv’s</a:t>
-            </a:r>
-            <a:r>
-              <a:rPr lang="en-US" sz="4400" dirty="0" smtClean="0">
-                <a:latin typeface="Arial"/>
-                <a:cs typeface="Arial"/>
-              </a:rPr>
-              <a:t> that compose them</a:t>
-            </a:r>
-          </a:p>
-        </p:txBody>
-      </p:sp>
-      <p:pic>
-        <p:nvPicPr>
-          <p:cNvPr id="8" name="Picture 7" descr="Boot_ddm_plot.jpeg"/>
-          <p:cNvPicPr>
-            <a:picLocks noChangeAspect="1"/>
-          </p:cNvPicPr>
-          <p:nvPr/>
-        </p:nvPicPr>
-        <p:blipFill>
-          <a:blip r:embed="rId19">
-            <a:extLst>
-              <a:ext uri="{28A0092B-C50C-407E-A947-70E740481C1C}">
-                <a14:useLocalDpi xmlns:a14="http://schemas.microsoft.com/office/drawing/2010/main" val="0"/>
-              </a:ext>
-            </a:extLst>
-          </a:blip>
-          <a:stretch>
-            <a:fillRect/>
-          </a:stretch>
-        </p:blipFill>
-        <p:spPr>
-          <a:xfrm>
-            <a:off x="11124963" y="11504263"/>
-            <a:ext cx="20116800" cy="3831771"/>
-          </a:xfrm>
-          <a:prstGeom prst="rect">
-            <a:avLst/>
-          </a:prstGeom>
-        </p:spPr>
-      </p:pic>
-      <p:sp>
-        <p:nvSpPr>
-          <p:cNvPr id="12" name="Rectangle 11"/>
-          <p:cNvSpPr/>
-          <p:nvPr/>
-        </p:nvSpPr>
-        <p:spPr>
-          <a:xfrm>
-            <a:off x="11091332" y="15130684"/>
-            <a:ext cx="26593525" cy="1446550"/>
-          </a:xfrm>
-          <a:prstGeom prst="rect">
-            <a:avLst/>
-          </a:prstGeom>
-        </p:spPr>
-        <p:txBody>
-          <a:bodyPr wrap="square">
-            <a:spAutoFit/>
-          </a:bodyPr>
-          <a:lstStyle/>
-          <a:p>
-            <a:pPr>
-              <a:buFont typeface="Arial"/>
-              <a:buChar char="•"/>
-            </a:pPr>
-            <a:r>
-              <a:rPr lang="en-US" sz="4400" dirty="0" smtClean="0">
-                <a:solidFill>
-                  <a:srgbClr val="000000"/>
-                </a:solidFill>
-                <a:latin typeface="Arial"/>
-                <a:cs typeface="Arial"/>
-                <a:sym typeface="Wingdings"/>
-              </a:rPr>
-              <a:t> Both contrast (b = -0.37, t(512) = -9.99) </a:t>
-            </a:r>
-            <a:r>
-              <a:rPr lang="en-US" sz="4400" dirty="0">
-                <a:solidFill>
-                  <a:srgbClr val="000000"/>
-                </a:solidFill>
-                <a:latin typeface="Arial"/>
-                <a:cs typeface="Arial"/>
-                <a:sym typeface="Wingdings"/>
-              </a:rPr>
-              <a:t>and </a:t>
-            </a:r>
-            <a:r>
-              <a:rPr lang="en-US" sz="4400" dirty="0" smtClean="0">
-                <a:solidFill>
-                  <a:srgbClr val="000000"/>
-                </a:solidFill>
-                <a:latin typeface="Arial"/>
-                <a:cs typeface="Arial"/>
-                <a:sym typeface="Wingdings"/>
-              </a:rPr>
-              <a:t>condition (b = -0.09, t(512) = -2.84) </a:t>
-            </a:r>
-            <a:r>
-              <a:rPr lang="en-US" sz="4400" dirty="0">
-                <a:solidFill>
-                  <a:srgbClr val="000000"/>
-                </a:solidFill>
-                <a:latin typeface="Arial"/>
-                <a:cs typeface="Arial"/>
-                <a:sym typeface="Wingdings"/>
-              </a:rPr>
-              <a:t>measures are less reliable than </a:t>
-            </a:r>
-            <a:r>
-              <a:rPr lang="en-US" sz="4400" dirty="0" smtClean="0">
-                <a:solidFill>
-                  <a:srgbClr val="000000"/>
-                </a:solidFill>
-                <a:latin typeface="Arial"/>
-                <a:cs typeface="Arial"/>
-                <a:sym typeface="Wingdings"/>
-              </a:rPr>
-              <a:t>measures </a:t>
-            </a:r>
-            <a:r>
-              <a:rPr lang="en-US" sz="4400" dirty="0">
-                <a:solidFill>
-                  <a:srgbClr val="000000"/>
-                </a:solidFill>
-                <a:latin typeface="Arial"/>
-                <a:cs typeface="Arial"/>
-                <a:sym typeface="Wingdings"/>
-              </a:rPr>
-              <a:t>that use </a:t>
-            </a:r>
-            <a:r>
-              <a:rPr lang="en-US" sz="4400" dirty="0" smtClean="0">
-                <a:solidFill>
-                  <a:srgbClr val="000000"/>
-                </a:solidFill>
-                <a:latin typeface="Arial"/>
-                <a:cs typeface="Arial"/>
-                <a:sym typeface="Wingdings"/>
-              </a:rPr>
-              <a:t>all trials </a:t>
-            </a:r>
-            <a:endParaRPr lang="en-US" sz="4400" dirty="0">
-              <a:solidFill>
-                <a:srgbClr val="000000"/>
-              </a:solidFill>
+            <a:r>
+              <a:rPr lang="en-US" sz="4000" dirty="0" smtClean="0">
+                <a:latin typeface="Arial"/>
+                <a:cs typeface="Arial"/>
+              </a:rPr>
+              <a:t>EZ measures from T1 (164 measures, n=552)</a:t>
+            </a:r>
+            <a:endParaRPr lang="en-US" sz="4000" dirty="0" smtClean="0">
               <a:latin typeface="Arial"/>
               <a:cs typeface="Arial"/>
             </a:endParaRPr>
           </a:p>
         </p:txBody>
       </p:sp>
-      <p:pic>
-        <p:nvPicPr>
-          <p:cNvPr id="15" name="Picture 14" descr="Sample_size.jpeg"/>
-          <p:cNvPicPr>
-            <a:picLocks noChangeAspect="1"/>
-          </p:cNvPicPr>
-          <p:nvPr/>
-        </p:nvPicPr>
-        <p:blipFill>
-          <a:blip r:embed="rId20">
-            <a:extLst>
-              <a:ext uri="{28A0092B-C50C-407E-A947-70E740481C1C}">
-                <a14:useLocalDpi xmlns:a14="http://schemas.microsoft.com/office/drawing/2010/main" val="0"/>
-              </a:ext>
-            </a:extLst>
-          </a:blip>
-          <a:stretch>
-            <a:fillRect/>
-          </a:stretch>
-        </p:blipFill>
-        <p:spPr>
-          <a:xfrm>
-            <a:off x="10928167" y="17662817"/>
-            <a:ext cx="6400800" cy="4572000"/>
-          </a:xfrm>
-          <a:prstGeom prst="rect">
-            <a:avLst/>
-          </a:prstGeom>
-        </p:spPr>
-      </p:pic>
-      <p:sp>
-        <p:nvSpPr>
-          <p:cNvPr id="27" name="Rectangle 26"/>
+      <p:sp>
+        <p:nvSpPr>
+          <p:cNvPr id="71" name="Rectangle 70"/>
           <p:cNvSpPr/>
           <p:nvPr/>
         </p:nvSpPr>
         <p:spPr>
           <a:xfrm>
-            <a:off x="11149278" y="22167597"/>
-            <a:ext cx="13223565" cy="1446550"/>
-          </a:xfrm>
-          <a:prstGeom prst="rect">
-            <a:avLst/>
-          </a:prstGeom>
-        </p:spPr>
-        <p:txBody>
-          <a:bodyPr wrap="square">
-            <a:spAutoFit/>
-          </a:bodyPr>
-          <a:lstStyle/>
-          <a:p>
-            <a:pPr>
-              <a:buFont typeface="Arial"/>
-              <a:buChar char="•"/>
-            </a:pPr>
-            <a:r>
-              <a:rPr lang="en-US" sz="4400" dirty="0">
-                <a:latin typeface="Arial"/>
-                <a:cs typeface="Arial"/>
-              </a:rPr>
-              <a:t> </a:t>
-            </a:r>
-            <a:r>
-              <a:rPr lang="en-US" sz="4400" dirty="0" smtClean="0">
-                <a:latin typeface="Arial"/>
-                <a:cs typeface="Arial"/>
-              </a:rPr>
-              <a:t>Conclusion does not change depending on </a:t>
-            </a:r>
-            <a:r>
-              <a:rPr lang="en-US" sz="4400" dirty="0">
-                <a:latin typeface="Arial"/>
-                <a:cs typeface="Arial"/>
-              </a:rPr>
-              <a:t>measure type (</a:t>
-            </a:r>
-            <a:r>
-              <a:rPr lang="en-US" sz="4400" dirty="0" smtClean="0">
-                <a:latin typeface="Arial"/>
-                <a:cs typeface="Arial"/>
-              </a:rPr>
-              <a:t>raw</a:t>
-            </a:r>
-            <a:r>
-              <a:rPr lang="en-US" sz="4400" dirty="0">
-                <a:latin typeface="Arial"/>
-                <a:cs typeface="Arial"/>
-              </a:rPr>
-              <a:t> </a:t>
-            </a:r>
-            <a:r>
-              <a:rPr lang="en-US" sz="4400" dirty="0" smtClean="0">
-                <a:latin typeface="Arial"/>
-                <a:cs typeface="Arial"/>
-              </a:rPr>
-              <a:t>vs. </a:t>
-            </a:r>
-            <a:r>
-              <a:rPr lang="en-US" sz="4400" dirty="0" err="1" smtClean="0">
-                <a:latin typeface="Arial"/>
-                <a:cs typeface="Arial"/>
-              </a:rPr>
-              <a:t>ddm</a:t>
-            </a:r>
-            <a:r>
-              <a:rPr lang="en-US" sz="4400" dirty="0" smtClean="0">
-                <a:latin typeface="Arial"/>
-                <a:cs typeface="Arial"/>
-              </a:rPr>
-              <a:t>, all trials vs. contrasts)</a:t>
-            </a:r>
-            <a:endParaRPr lang="en-US" sz="4400" dirty="0">
-              <a:latin typeface="Arial"/>
-              <a:cs typeface="Arial"/>
-            </a:endParaRPr>
-          </a:p>
-        </p:txBody>
-      </p:sp>
-      <p:sp>
-        <p:nvSpPr>
-          <p:cNvPr id="67" name="Rectangle 66"/>
-          <p:cNvSpPr/>
-          <p:nvPr/>
-        </p:nvSpPr>
-        <p:spPr>
-          <a:xfrm>
-            <a:off x="11174327" y="27328876"/>
-            <a:ext cx="6705743" cy="1310814"/>
+            <a:off x="18781048" y="27533882"/>
+            <a:ext cx="1945810" cy="900803"/>
           </a:xfrm>
           <a:prstGeom prst="rect">
             <a:avLst/>
@@ -6683,13 +6668,13 @@
           <a:lstStyle/>
           <a:p>
             <a:r>
-              <a:rPr lang="en-US" sz="4400" dirty="0" smtClean="0">
-                <a:latin typeface="Arial"/>
-                <a:cs typeface="Arial"/>
-              </a:rPr>
-              <a:t>EZ measures from T1 (164 measures, n=552)</a:t>
-            </a:r>
-            <a:endParaRPr lang="en-US" sz="4400" dirty="0" smtClean="0">
+              <a:rPr lang="en-US" sz="4000" dirty="0" smtClean="0">
+                <a:latin typeface="Arial"/>
+                <a:cs typeface="Arial"/>
+              </a:rPr>
+              <a:t>PCA</a:t>
+            </a:r>
+            <a:endParaRPr lang="en-US" sz="4000" dirty="0" smtClean="0">
               <a:latin typeface="Arial"/>
               <a:cs typeface="Arial"/>
             </a:endParaRPr>
@@ -6698,14 +6683,14 @@
       </p:sp>
       <p:sp>
         <p:nvSpPr>
-          <p:cNvPr id="71" name="Rectangle 70"/>
+          <p:cNvPr id="72" name="Rectangle 71"/>
           <p:cNvSpPr/>
           <p:nvPr/>
         </p:nvSpPr>
         <p:spPr>
           <a:xfrm>
-            <a:off x="18781048" y="27533882"/>
-            <a:ext cx="1945810" cy="900803"/>
+            <a:off x="22111676" y="27328523"/>
+            <a:ext cx="6128556" cy="1311520"/>
           </a:xfrm>
           <a:prstGeom prst="rect">
             <a:avLst/>
@@ -6719,13 +6704,20 @@
           <a:lstStyle/>
           <a:p>
             <a:r>
-              <a:rPr lang="en-US" sz="4400" dirty="0" smtClean="0">
-                <a:latin typeface="Arial"/>
-                <a:cs typeface="Arial"/>
-              </a:rPr>
-              <a:t>PCA</a:t>
-            </a:r>
-            <a:endParaRPr lang="en-US" sz="4400" dirty="0" smtClean="0">
+              <a:rPr lang="en-US" sz="4000" dirty="0" smtClean="0">
+                <a:latin typeface="Arial"/>
+                <a:cs typeface="Arial"/>
+              </a:rPr>
+              <a:t>Hierarchical clustering of factor </a:t>
+            </a:r>
+            <a:r>
+              <a:rPr lang="en-US" sz="4000" i="1" dirty="0" smtClean="0">
+                <a:latin typeface="Arial"/>
+                <a:cs typeface="Arial"/>
+              </a:rPr>
+              <a:t>loadings</a:t>
+            </a:r>
+            <a:endParaRPr lang="en-US" sz="4000" i="1" dirty="0" smtClean="0">
               <a:latin typeface="Arial"/>
               <a:cs typeface="Arial"/>
             </a:endParaRPr>
@@ -6734,14 +6726,14 @@
       </p:sp>
       <p:sp>
         <p:nvSpPr>
-          <p:cNvPr id="72" name="Rectangle 71"/>
+          <p:cNvPr id="73" name="Rectangle 72"/>
           <p:cNvSpPr/>
           <p:nvPr/>
         </p:nvSpPr>
         <p:spPr>
           <a:xfrm>
-            <a:off x="22111676" y="27328523"/>
-            <a:ext cx="6128556" cy="1311520"/>
+            <a:off x="11199588" y="28726639"/>
+            <a:ext cx="6129379" cy="1465484"/>
           </a:xfrm>
           <a:prstGeom prst="rect">
             <a:avLst/>
@@ -6755,20 +6747,27 @@
           <a:lstStyle/>
           <a:p>
             <a:r>
-              <a:rPr lang="en-US" sz="4400" dirty="0" smtClean="0">
-                <a:latin typeface="Arial"/>
-                <a:cs typeface="Arial"/>
-              </a:rPr>
-              <a:t>Hierarchical clustering of factor </a:t>
-            </a:r>
-            <a:r>
-              <a:rPr lang="en-US" sz="4400" i="1" dirty="0" smtClean="0">
-                <a:latin typeface="Arial"/>
-                <a:cs typeface="Arial"/>
-              </a:rPr>
-              <a:t>loadings</a:t>
-            </a:r>
-            <a:endParaRPr lang="en-US" sz="4400" i="1" dirty="0" smtClean="0">
+              <a:rPr lang="en-US" sz="4000" dirty="0" smtClean="0">
+                <a:latin typeface="Arial"/>
+                <a:cs typeface="Arial"/>
+              </a:rPr>
+              <a:t>Predict factor </a:t>
+            </a:r>
+            <a:r>
+              <a:rPr lang="en-US" sz="4000" i="1" dirty="0" smtClean="0">
+                <a:latin typeface="Arial"/>
+                <a:cs typeface="Arial"/>
+              </a:rPr>
+              <a:t>score</a:t>
+            </a:r>
+            <a:r>
+              <a:rPr lang="en-US" sz="4000" dirty="0" smtClean="0">
+                <a:latin typeface="Arial"/>
+                <a:cs typeface="Arial"/>
+              </a:rPr>
+              <a:t>s from T1 PCA for T2 </a:t>
+            </a:r>
+            <a:endParaRPr lang="en-US" sz="4000" dirty="0" smtClean="0">
               <a:latin typeface="Arial"/>
               <a:cs typeface="Arial"/>
             </a:endParaRPr>
@@ -6777,14 +6776,14 @@
       </p:sp>
       <p:sp>
         <p:nvSpPr>
-          <p:cNvPr id="73" name="Rectangle 72"/>
+          <p:cNvPr id="74" name="Rectangle 73"/>
           <p:cNvSpPr/>
           <p:nvPr/>
         </p:nvSpPr>
         <p:spPr>
           <a:xfrm>
-            <a:off x="11199588" y="28968519"/>
-            <a:ext cx="6129379" cy="1465484"/>
+            <a:off x="18794469" y="28726639"/>
+            <a:ext cx="8485452" cy="1424350"/>
           </a:xfrm>
           <a:prstGeom prst="rect">
             <a:avLst/>
@@ -6798,84 +6797,34 @@
           <a:lstStyle/>
           <a:p>
             <a:r>
-              <a:rPr lang="en-US" sz="4400" dirty="0" smtClean="0">
-                <a:latin typeface="Arial"/>
-                <a:cs typeface="Arial"/>
-              </a:rPr>
-              <a:t>Predict factor </a:t>
-            </a:r>
-            <a:r>
-              <a:rPr lang="en-US" sz="4400" i="1" dirty="0" smtClean="0">
-                <a:latin typeface="Arial"/>
-                <a:cs typeface="Arial"/>
-              </a:rPr>
-              <a:t>score</a:t>
-            </a:r>
-            <a:r>
-              <a:rPr lang="en-US" sz="4400" dirty="0" smtClean="0">
-                <a:latin typeface="Arial"/>
-                <a:cs typeface="Arial"/>
-              </a:rPr>
-              <a:t>s from T1 PCA for T2 </a:t>
-            </a:r>
-            <a:endParaRPr lang="en-US" sz="4400" dirty="0" smtClean="0">
-              <a:latin typeface="Arial"/>
-              <a:cs typeface="Arial"/>
-            </a:endParaRPr>
-          </a:p>
-        </p:txBody>
-      </p:sp>
-      <p:sp>
-        <p:nvSpPr>
-          <p:cNvPr id="74" name="Rectangle 73"/>
-          <p:cNvSpPr/>
-          <p:nvPr/>
-        </p:nvSpPr>
-        <p:spPr>
-          <a:xfrm>
-            <a:off x="18794469" y="28968519"/>
-            <a:ext cx="8485452" cy="1424350"/>
-          </a:xfrm>
-          <a:prstGeom prst="rect">
-            <a:avLst/>
-          </a:prstGeom>
-          <a:noFill/>
-        </p:spPr>
-        <p:txBody>
-          <a:bodyPr wrap="square" lIns="274320" rIns="274320" rtlCol="0">
-            <a:noAutofit/>
-          </a:bodyPr>
-          <a:lstStyle/>
-          <a:p>
-            <a:r>
-              <a:rPr lang="en-US" sz="4400" dirty="0" smtClean="0">
+              <a:rPr lang="en-US" sz="4000" dirty="0" smtClean="0">
                 <a:latin typeface="Arial"/>
                 <a:cs typeface="Arial"/>
               </a:rPr>
               <a:t>ICC fo</a:t>
             </a:r>
             <a:r>
-              <a:rPr lang="en-US" sz="4400" dirty="0" smtClean="0">
+              <a:rPr lang="en-US" sz="4000" dirty="0" smtClean="0">
                 <a:latin typeface="Arial"/>
                 <a:cs typeface="Arial"/>
               </a:rPr>
               <a:t>r the 3 PCs </a:t>
             </a:r>
             <a:r>
-              <a:rPr lang="en-US" sz="4400" dirty="0" err="1" smtClean="0">
+              <a:rPr lang="en-US" sz="4000" dirty="0" err="1" smtClean="0">
                 <a:latin typeface="Arial"/>
                 <a:cs typeface="Arial"/>
               </a:rPr>
               <a:t>vs</a:t>
             </a:r>
             <a:r>
-              <a:rPr lang="en-US" sz="4400" dirty="0" smtClean="0">
+              <a:rPr lang="en-US" sz="4000" dirty="0" smtClean="0">
                 <a:latin typeface="Arial"/>
                 <a:cs typeface="Arial"/>
               </a:rPr>
               <a:t> ICC of 164 EZ measures measures</a:t>
             </a:r>
-            <a:endParaRPr lang="en-US" sz="4400" dirty="0" smtClean="0">
+            <a:endParaRPr lang="en-US" sz="4000" dirty="0" smtClean="0">
               <a:latin typeface="Arial"/>
               <a:cs typeface="Arial"/>
             </a:endParaRPr>
@@ -6890,7 +6839,7 @@
         </p:nvCxnSpPr>
         <p:spPr>
           <a:xfrm>
-            <a:off x="17880069" y="27787135"/>
+            <a:off x="17456709" y="27787135"/>
             <a:ext cx="914400" cy="0"/>
           </a:xfrm>
           <a:prstGeom prst="straightConnector1">
@@ -7025,7 +6974,7 @@
         </p:nvCxnSpPr>
         <p:spPr>
           <a:xfrm flipV="1">
-            <a:off x="17328967" y="29680694"/>
+            <a:off x="17328967" y="29438814"/>
             <a:ext cx="1465502" cy="20567"/>
           </a:xfrm>
           <a:prstGeom prst="straightConnector1">
@@ -7060,7 +7009,7 @@
         </p:nvCxnSpPr>
         <p:spPr>
           <a:xfrm>
-            <a:off x="27279921" y="29680694"/>
+            <a:off x="27279921" y="29438814"/>
             <a:ext cx="3659442" cy="0"/>
           </a:xfrm>
           <a:prstGeom prst="straightConnector1">
@@ -7085,6 +7034,338 @@
           </a:fontRef>
         </p:style>
       </p:cxnSp>
+      <p:pic>
+        <p:nvPicPr>
+          <p:cNvPr id="94" name="Picture 93" descr="EZ_PCA3_HClust_nolables.jpeg"/>
+          <p:cNvPicPr>
+            <a:picLocks noChangeAspect="1"/>
+          </p:cNvPicPr>
+          <p:nvPr/>
+        </p:nvPicPr>
+        <p:blipFill rotWithShape="1">
+          <a:blip r:embed="rId19">
+            <a:extLst>
+              <a:ext uri="{28A0092B-C50C-407E-A947-70E740481C1C}">
+                <a14:useLocalDpi xmlns:a14="http://schemas.microsoft.com/office/drawing/2010/main" val="0"/>
+              </a:ext>
+            </a:extLst>
+          </a:blip>
+          <a:srcRect l="5817" t="23768" r="4402" b="20204"/>
+          <a:stretch/>
+        </p:blipFill>
+        <p:spPr>
+          <a:xfrm>
+            <a:off x="11124963" y="24835608"/>
+            <a:ext cx="22987034" cy="2417677"/>
+          </a:xfrm>
+          <a:prstGeom prst="rect">
+            <a:avLst/>
+          </a:prstGeom>
+        </p:spPr>
+      </p:pic>
+      <p:pic>
+        <p:nvPicPr>
+          <p:cNvPr id="98" name="Picture 97" descr="EZ_clust_rel.jpeg"/>
+          <p:cNvPicPr>
+            <a:picLocks noChangeAspect="1"/>
+          </p:cNvPicPr>
+          <p:nvPr/>
+        </p:nvPicPr>
+        <p:blipFill>
+          <a:blip r:embed="rId20">
+            <a:extLst>
+              <a:ext uri="{28A0092B-C50C-407E-A947-70E740481C1C}">
+                <a14:useLocalDpi xmlns:a14="http://schemas.microsoft.com/office/drawing/2010/main" val="0"/>
+              </a:ext>
+            </a:extLst>
+          </a:blip>
+          <a:stretch>
+            <a:fillRect/>
+          </a:stretch>
+        </p:blipFill>
+        <p:spPr>
+          <a:xfrm>
+            <a:off x="31427722" y="27363237"/>
+            <a:ext cx="6117336" cy="3986784"/>
+          </a:xfrm>
+          <a:prstGeom prst="rect">
+            <a:avLst/>
+          </a:prstGeom>
+        </p:spPr>
+      </p:pic>
+      <p:graphicFrame>
+        <p:nvGraphicFramePr>
+          <p:cNvPr id="100" name="Table 99"/>
+          <p:cNvGraphicFramePr>
+            <a:graphicFrameLocks noGrp="1"/>
+          </p:cNvGraphicFramePr>
+          <p:nvPr>
+            <p:extLst>
+              <p:ext uri="{D42A27DB-BD31-4B8C-83A1-F6EECF244321}">
+                <p14:modId xmlns:p14="http://schemas.microsoft.com/office/powerpoint/2010/main" val="1321121019"/>
+              </p:ext>
+            </p:extLst>
+          </p:nvPr>
+        </p:nvGraphicFramePr>
+        <p:xfrm>
+          <a:off x="21586756" y="30141504"/>
+          <a:ext cx="10231200" cy="1645920"/>
+        </p:xfrm>
+        <a:graphic>
+          <a:graphicData uri="http://schemas.openxmlformats.org/drawingml/2006/table">
+            <a:tbl>
+              <a:tblPr firstRow="1" bandRow="1">
+                <a:tableStyleId>{2D5ABB26-0587-4C30-8999-92F81FD0307C}</a:tableStyleId>
+              </a:tblPr>
+              <a:tblGrid>
+                <a:gridCol w="2557800"/>
+                <a:gridCol w="2557800"/>
+                <a:gridCol w="2557800"/>
+                <a:gridCol w="2557800"/>
+              </a:tblGrid>
+              <a:tr h="370840">
+                <a:tc>
+                  <a:txBody>
+                    <a:bodyPr/>
+                    <a:lstStyle/>
+                    <a:p>
+                      <a:endParaRPr lang="en-US" sz="3000" dirty="0">
+                        <a:latin typeface="Arial"/>
+                        <a:cs typeface="Arial"/>
+                      </a:endParaRPr>
+                    </a:p>
+                  </a:txBody>
+                  <a:tcPr/>
+                </a:tc>
+                <a:tc>
+                  <a:txBody>
+                    <a:bodyPr/>
+                    <a:lstStyle/>
+                    <a:p>
+                      <a:r>
+                        <a:rPr lang="en-US" sz="3000" dirty="0" smtClean="0">
+                          <a:latin typeface="Arial"/>
+                          <a:cs typeface="Arial"/>
+                        </a:rPr>
+                        <a:t>Drift rate</a:t>
+                      </a:r>
+                      <a:endParaRPr lang="en-US" sz="3000" dirty="0">
+                        <a:latin typeface="Arial"/>
+                        <a:cs typeface="Arial"/>
+                      </a:endParaRPr>
+                    </a:p>
+                  </a:txBody>
+                  <a:tcPr/>
+                </a:tc>
+                <a:tc>
+                  <a:txBody>
+                    <a:bodyPr/>
+                    <a:lstStyle/>
+                    <a:p>
+                      <a:r>
+                        <a:rPr lang="en-US" sz="3000" dirty="0" smtClean="0">
+                          <a:latin typeface="Arial"/>
+                          <a:cs typeface="Arial"/>
+                        </a:rPr>
+                        <a:t>Threshold</a:t>
+                      </a:r>
+                      <a:endParaRPr lang="en-US" sz="3000" dirty="0">
+                        <a:latin typeface="Arial"/>
+                        <a:cs typeface="Arial"/>
+                      </a:endParaRPr>
+                    </a:p>
+                  </a:txBody>
+                  <a:tcPr/>
+                </a:tc>
+                <a:tc>
+                  <a:txBody>
+                    <a:bodyPr/>
+                    <a:lstStyle/>
+                    <a:p>
+                      <a:r>
+                        <a:rPr lang="en-US" sz="3000" dirty="0" smtClean="0">
+                          <a:latin typeface="Arial"/>
+                          <a:cs typeface="Arial"/>
+                        </a:rPr>
+                        <a:t>Non-decision</a:t>
+                      </a:r>
+                      <a:endParaRPr lang="en-US" sz="3000" dirty="0">
+                        <a:latin typeface="Arial"/>
+                        <a:cs typeface="Arial"/>
+                      </a:endParaRPr>
+                    </a:p>
+                  </a:txBody>
+                  <a:tcPr/>
+                </a:tc>
+              </a:tr>
+              <a:tr h="370840">
+                <a:tc>
+                  <a:txBody>
+                    <a:bodyPr/>
+                    <a:lstStyle/>
+                    <a:p>
+                      <a:r>
+                        <a:rPr lang="en-US" sz="3000" dirty="0" smtClean="0">
+                          <a:latin typeface="Arial"/>
+                          <a:cs typeface="Arial"/>
+                        </a:rPr>
+                        <a:t>DVs (median)</a:t>
+                      </a:r>
+                      <a:endParaRPr lang="en-US" sz="3000" dirty="0">
+                        <a:latin typeface="Arial"/>
+                        <a:cs typeface="Arial"/>
+                      </a:endParaRPr>
+                    </a:p>
+                  </a:txBody>
+                  <a:tcPr/>
+                </a:tc>
+                <a:tc>
+                  <a:txBody>
+                    <a:bodyPr/>
+                    <a:lstStyle/>
+                    <a:p>
+                      <a:r>
+                        <a:rPr lang="en-US" sz="3000" dirty="0" smtClean="0">
+                          <a:latin typeface="Arial"/>
+                          <a:cs typeface="Arial"/>
+                        </a:rPr>
+                        <a:t>0.51</a:t>
+                      </a:r>
+                      <a:endParaRPr lang="en-US" sz="3000" dirty="0">
+                        <a:latin typeface="Arial"/>
+                        <a:cs typeface="Arial"/>
+                      </a:endParaRPr>
+                    </a:p>
+                  </a:txBody>
+                  <a:tcPr/>
+                </a:tc>
+                <a:tc>
+                  <a:txBody>
+                    <a:bodyPr/>
+                    <a:lstStyle/>
+                    <a:p>
+                      <a:r>
+                        <a:rPr lang="en-US" sz="3000" dirty="0" smtClean="0">
+                          <a:latin typeface="Arial"/>
+                          <a:cs typeface="Arial"/>
+                        </a:rPr>
+                        <a:t>0.48</a:t>
+                      </a:r>
+                      <a:endParaRPr lang="en-US" sz="3000" dirty="0">
+                        <a:latin typeface="Arial"/>
+                        <a:cs typeface="Arial"/>
+                      </a:endParaRPr>
+                    </a:p>
+                  </a:txBody>
+                  <a:tcPr/>
+                </a:tc>
+                <a:tc>
+                  <a:txBody>
+                    <a:bodyPr/>
+                    <a:lstStyle/>
+                    <a:p>
+                      <a:r>
+                        <a:rPr lang="en-US" sz="3000" dirty="0" smtClean="0">
+                          <a:latin typeface="Arial"/>
+                          <a:cs typeface="Arial"/>
+                        </a:rPr>
+                        <a:t>0.51</a:t>
+                      </a:r>
+                      <a:endParaRPr lang="en-US" sz="3000" dirty="0">
+                        <a:latin typeface="Arial"/>
+                        <a:cs typeface="Arial"/>
+                      </a:endParaRPr>
+                    </a:p>
+                  </a:txBody>
+                  <a:tcPr/>
+                </a:tc>
+              </a:tr>
+              <a:tr h="370840">
+                <a:tc>
+                  <a:txBody>
+                    <a:bodyPr/>
+                    <a:lstStyle/>
+                    <a:p>
+                      <a:r>
+                        <a:rPr lang="en-US" sz="3000" dirty="0" smtClean="0">
+                          <a:latin typeface="Arial"/>
+                          <a:cs typeface="Arial"/>
+                        </a:rPr>
+                        <a:t>PC</a:t>
+                      </a:r>
+                      <a:endParaRPr lang="en-US" sz="3000" dirty="0">
+                        <a:latin typeface="Arial"/>
+                        <a:cs typeface="Arial"/>
+                      </a:endParaRPr>
+                    </a:p>
+                  </a:txBody>
+                  <a:tcPr/>
+                </a:tc>
+                <a:tc>
+                  <a:txBody>
+                    <a:bodyPr/>
+                    <a:lstStyle/>
+                    <a:p>
+                      <a:r>
+                        <a:rPr lang="en-US" sz="3000" dirty="0" smtClean="0">
+                          <a:latin typeface="Arial"/>
+                          <a:cs typeface="Arial"/>
+                        </a:rPr>
+                        <a:t>0.80</a:t>
+                      </a:r>
+                      <a:endParaRPr lang="en-US" sz="3000" dirty="0">
+                        <a:latin typeface="Arial"/>
+                        <a:cs typeface="Arial"/>
+                      </a:endParaRPr>
+                    </a:p>
+                  </a:txBody>
+                  <a:tcPr/>
+                </a:tc>
+                <a:tc>
+                  <a:txBody>
+                    <a:bodyPr/>
+                    <a:lstStyle/>
+                    <a:p>
+                      <a:r>
+                        <a:rPr lang="en-US" sz="3000" dirty="0" smtClean="0">
+                          <a:latin typeface="Arial"/>
+                          <a:cs typeface="Arial"/>
+                        </a:rPr>
+                        <a:t>0.87</a:t>
+                      </a:r>
+                      <a:endParaRPr lang="en-US" sz="3000" dirty="0">
+                        <a:latin typeface="Arial"/>
+                        <a:cs typeface="Arial"/>
+                      </a:endParaRPr>
+                    </a:p>
+                  </a:txBody>
+                  <a:tcPr/>
+                </a:tc>
+                <a:tc>
+                  <a:txBody>
+                    <a:bodyPr/>
+                    <a:lstStyle/>
+                    <a:p>
+                      <a:r>
+                        <a:rPr lang="en-US" sz="3000" dirty="0" smtClean="0">
+                          <a:latin typeface="Arial"/>
+                          <a:cs typeface="Arial"/>
+                        </a:rPr>
+                        <a:t>0.86</a:t>
+                      </a:r>
+                      <a:endParaRPr lang="en-US" sz="3000" dirty="0">
+                        <a:latin typeface="Arial"/>
+                        <a:cs typeface="Arial"/>
+                      </a:endParaRPr>
+                    </a:p>
+                  </a:txBody>
+                  <a:tcPr/>
+                </a:tc>
+              </a:tr>
+            </a:tbl>
+          </a:graphicData>
+        </a:graphic>
+      </p:graphicFrame>
     </p:spTree>
   </p:cSld>
   <p:clrMapOvr>

</xml_diff>